<commit_message>
logger configuration changed in order to improve performance, now the wonderer task logs when it starts to execute.
</commit_message>
<xml_diff>
--- a/presentation-june/Presentation.pptx
+++ b/presentation-june/Presentation.pptx
@@ -5,7 +5,7 @@
     <p:sldMasterId id="2147483648" r:id="rId1"/>
   </p:sldMasterIdLst>
   <p:notesMasterIdLst>
-    <p:notesMasterId r:id="rId15"/>
+    <p:notesMasterId r:id="rId16"/>
   </p:notesMasterIdLst>
   <p:sldIdLst>
     <p:sldId id="256" r:id="rId2"/>
@@ -16,11 +16,12 @@
     <p:sldId id="261" r:id="rId7"/>
     <p:sldId id="262" r:id="rId8"/>
     <p:sldId id="263" r:id="rId9"/>
-    <p:sldId id="264" r:id="rId10"/>
-    <p:sldId id="265" r:id="rId11"/>
-    <p:sldId id="266" r:id="rId12"/>
-    <p:sldId id="267" r:id="rId13"/>
-    <p:sldId id="268" r:id="rId14"/>
+    <p:sldId id="270" r:id="rId10"/>
+    <p:sldId id="264" r:id="rId11"/>
+    <p:sldId id="265" r:id="rId12"/>
+    <p:sldId id="266" r:id="rId13"/>
+    <p:sldId id="267" r:id="rId14"/>
+    <p:sldId id="268" r:id="rId15"/>
   </p:sldIdLst>
   <p:sldSz cx="9144000" cy="6858000" type="screen4x3"/>
   <p:notesSz cx="6858000" cy="9144000"/>
@@ -632,7 +633,7 @@
           <a:p>
             <a:fld id="{D2D90C8E-9ABA-428A-AE3B-7180319A3F53}" type="datetimeFigureOut">
               <a:rPr lang="en-GB" smtClean="0"/>
-              <a:t>30/05/2012</a:t>
+              <a:t>01/06/2012</a:t>
             </a:fld>
             <a:endParaRPr lang="en-GB"/>
           </a:p>
@@ -1281,7 +1282,7 @@
           <a:p>
             <a:fld id="{359ABEBD-ED10-45EA-AD6C-D56FB4AE805F}" type="slidenum">
               <a:rPr lang="en-GB" smtClean="0"/>
-              <a:t>9</a:t>
+              <a:t>10</a:t>
             </a:fld>
             <a:endParaRPr lang="en-GB"/>
           </a:p>
@@ -1523,7 +1524,7 @@
           <a:p>
             <a:fld id="{70186140-57E4-4B6F-BB49-D5C1E28E250A}" type="datetimeFigureOut">
               <a:rPr lang="en-GB" smtClean="0"/>
-              <a:t>30/05/2012</a:t>
+              <a:t>01/06/2012</a:t>
             </a:fld>
             <a:endParaRPr lang="en-GB"/>
           </a:p>
@@ -1700,7 +1701,7 @@
           <a:p>
             <a:fld id="{70186140-57E4-4B6F-BB49-D5C1E28E250A}" type="datetimeFigureOut">
               <a:rPr lang="en-GB" smtClean="0"/>
-              <a:t>30/05/2012</a:t>
+              <a:t>01/06/2012</a:t>
             </a:fld>
             <a:endParaRPr lang="en-GB"/>
           </a:p>
@@ -1880,7 +1881,7 @@
           <a:p>
             <a:fld id="{70186140-57E4-4B6F-BB49-D5C1E28E250A}" type="datetimeFigureOut">
               <a:rPr lang="en-GB" smtClean="0"/>
-              <a:t>30/05/2012</a:t>
+              <a:t>01/06/2012</a:t>
             </a:fld>
             <a:endParaRPr lang="en-GB"/>
           </a:p>
@@ -2062,7 +2063,7 @@
           <a:p>
             <a:fld id="{70186140-57E4-4B6F-BB49-D5C1E28E250A}" type="datetimeFigureOut">
               <a:rPr lang="en-GB" smtClean="0"/>
-              <a:t>30/05/2012</a:t>
+              <a:t>01/06/2012</a:t>
             </a:fld>
             <a:endParaRPr lang="en-GB"/>
           </a:p>
@@ -2361,7 +2362,7 @@
           <a:p>
             <a:fld id="{70186140-57E4-4B6F-BB49-D5C1E28E250A}" type="datetimeFigureOut">
               <a:rPr lang="en-GB" smtClean="0"/>
-              <a:t>30/05/2012</a:t>
+              <a:t>01/06/2012</a:t>
             </a:fld>
             <a:endParaRPr lang="en-GB"/>
           </a:p>
@@ -2649,7 +2650,7 @@
           <a:p>
             <a:fld id="{70186140-57E4-4B6F-BB49-D5C1E28E250A}" type="datetimeFigureOut">
               <a:rPr lang="en-GB" smtClean="0"/>
-              <a:t>30/05/2012</a:t>
+              <a:t>01/06/2012</a:t>
             </a:fld>
             <a:endParaRPr lang="en-GB"/>
           </a:p>
@@ -3071,7 +3072,7 @@
           <a:p>
             <a:fld id="{70186140-57E4-4B6F-BB49-D5C1E28E250A}" type="datetimeFigureOut">
               <a:rPr lang="en-GB" smtClean="0"/>
-              <a:t>30/05/2012</a:t>
+              <a:t>01/06/2012</a:t>
             </a:fld>
             <a:endParaRPr lang="en-GB"/>
           </a:p>
@@ -3189,7 +3190,7 @@
           <a:p>
             <a:fld id="{70186140-57E4-4B6F-BB49-D5C1E28E250A}" type="datetimeFigureOut">
               <a:rPr lang="en-GB" smtClean="0"/>
-              <a:t>30/05/2012</a:t>
+              <a:t>01/06/2012</a:t>
             </a:fld>
             <a:endParaRPr lang="en-GB"/>
           </a:p>
@@ -3284,7 +3285,7 @@
           <a:p>
             <a:fld id="{70186140-57E4-4B6F-BB49-D5C1E28E250A}" type="datetimeFigureOut">
               <a:rPr lang="en-GB" smtClean="0"/>
-              <a:t>30/05/2012</a:t>
+              <a:t>01/06/2012</a:t>
             </a:fld>
             <a:endParaRPr lang="en-GB"/>
           </a:p>
@@ -3561,7 +3562,7 @@
           <a:p>
             <a:fld id="{70186140-57E4-4B6F-BB49-D5C1E28E250A}" type="datetimeFigureOut">
               <a:rPr lang="en-GB" smtClean="0"/>
-              <a:t>30/05/2012</a:t>
+              <a:t>01/06/2012</a:t>
             </a:fld>
             <a:endParaRPr lang="en-GB"/>
           </a:p>
@@ -3814,7 +3815,7 @@
           <a:p>
             <a:fld id="{70186140-57E4-4B6F-BB49-D5C1E28E250A}" type="datetimeFigureOut">
               <a:rPr lang="en-GB" smtClean="0"/>
-              <a:t>30/05/2012</a:t>
+              <a:t>01/06/2012</a:t>
             </a:fld>
             <a:endParaRPr lang="en-GB"/>
           </a:p>
@@ -4027,7 +4028,7 @@
           <a:p>
             <a:fld id="{70186140-57E4-4B6F-BB49-D5C1E28E250A}" type="datetimeFigureOut">
               <a:rPr lang="en-GB" smtClean="0"/>
-              <a:t>30/05/2012</a:t>
+              <a:t>01/06/2012</a:t>
             </a:fld>
             <a:endParaRPr lang="en-GB"/>
           </a:p>
@@ -4634,6 +4635,272 @@
           <a:p>
             <a:r>
               <a:rPr lang="en-GB" dirty="0" smtClean="0"/>
+              <a:t>Proposed Experiment</a:t>
+            </a:r>
+            <a:endParaRPr lang="en-GB" dirty="0"/>
+          </a:p>
+        </p:txBody>
+      </p:sp>
+      <p:sp>
+        <p:nvSpPr>
+          <p:cNvPr id="5" name="Content Placeholder 4"/>
+          <p:cNvSpPr>
+            <a:spLocks noGrp="1"/>
+          </p:cNvSpPr>
+          <p:nvPr>
+            <p:ph idx="1"/>
+          </p:nvPr>
+        </p:nvSpPr>
+        <p:spPr/>
+        <p:txBody>
+          <a:bodyPr/>
+          <a:lstStyle/>
+          <a:p>
+            <a:pPr>
+              <a:spcBef>
+                <a:spcPts val="3000"/>
+              </a:spcBef>
+            </a:pPr>
+            <a:r>
+              <a:rPr lang="en-GB" b="1" dirty="0" smtClean="0"/>
+              <a:t>Objective: </a:t>
+            </a:r>
+            <a:r>
+              <a:rPr lang="en-GB" dirty="0"/>
+              <a:t>Investigate how information is propagated throughout the </a:t>
+            </a:r>
+            <a:r>
+              <a:rPr lang="en-GB" dirty="0" smtClean="0"/>
+              <a:t>colony.</a:t>
+            </a:r>
+          </a:p>
+          <a:p>
+            <a:pPr>
+              <a:spcBef>
+                <a:spcPts val="3000"/>
+              </a:spcBef>
+            </a:pPr>
+            <a:r>
+              <a:rPr lang="en-GB" b="1" dirty="0"/>
+              <a:t>Study case: </a:t>
+            </a:r>
+            <a:r>
+              <a:rPr lang="en-GB" dirty="0"/>
+              <a:t>addition of a predator near the colony nest after sometime of simulation</a:t>
+            </a:r>
+            <a:r>
+              <a:rPr lang="en-GB" dirty="0" smtClean="0"/>
+              <a:t>.</a:t>
+            </a:r>
+            <a:endParaRPr lang="en-GB" dirty="0"/>
+          </a:p>
+        </p:txBody>
+      </p:sp>
+    </p:spTree>
+    <p:extLst>
+      <p:ext uri="{BB962C8B-B14F-4D97-AF65-F5344CB8AC3E}">
+        <p14:creationId xmlns:p14="http://schemas.microsoft.com/office/powerpoint/2010/main" val="138210221"/>
+      </p:ext>
+    </p:extLst>
+  </p:cSld>
+  <p:clrMapOvr>
+    <a:masterClrMapping/>
+  </p:clrMapOvr>
+  <p:timing>
+    <p:tnLst>
+      <p:par>
+        <p:cTn id="1" dur="indefinite" restart="never" nodeType="tmRoot">
+          <p:childTnLst>
+            <p:seq concurrent="1" nextAc="seek">
+              <p:cTn id="2" dur="indefinite" nodeType="mainSeq">
+                <p:childTnLst>
+                  <p:par>
+                    <p:cTn id="3" fill="hold">
+                      <p:stCondLst>
+                        <p:cond delay="indefinite"/>
+                        <p:cond evt="onBegin" delay="0">
+                          <p:tn val="2"/>
+                        </p:cond>
+                      </p:stCondLst>
+                      <p:childTnLst>
+                        <p:par>
+                          <p:cTn id="4" fill="hold">
+                            <p:stCondLst>
+                              <p:cond delay="0"/>
+                            </p:stCondLst>
+                            <p:childTnLst>
+                              <p:par>
+                                <p:cTn id="5" presetID="10" presetClass="entr" presetSubtype="0" fill="hold" grpId="0" nodeType="afterEffect">
+                                  <p:stCondLst>
+                                    <p:cond delay="0"/>
+                                  </p:stCondLst>
+                                  <p:childTnLst>
+                                    <p:set>
+                                      <p:cBhvr>
+                                        <p:cTn id="6" dur="1" fill="hold">
+                                          <p:stCondLst>
+                                            <p:cond delay="0"/>
+                                          </p:stCondLst>
+                                        </p:cTn>
+                                        <p:tgtEl>
+                                          <p:spTgt spid="5">
+                                            <p:txEl>
+                                              <p:pRg st="0" end="0"/>
+                                            </p:txEl>
+                                          </p:spTgt>
+                                        </p:tgtEl>
+                                        <p:attrNameLst>
+                                          <p:attrName>style.visibility</p:attrName>
+                                        </p:attrNameLst>
+                                      </p:cBhvr>
+                                      <p:to>
+                                        <p:strVal val="visible"/>
+                                      </p:to>
+                                    </p:set>
+                                    <p:animEffect transition="in" filter="fade">
+                                      <p:cBhvr>
+                                        <p:cTn id="7" dur="500"/>
+                                        <p:tgtEl>
+                                          <p:spTgt spid="5">
+                                            <p:txEl>
+                                              <p:pRg st="0" end="0"/>
+                                            </p:txEl>
+                                          </p:spTgt>
+                                        </p:tgtEl>
+                                      </p:cBhvr>
+                                    </p:animEffect>
+                                  </p:childTnLst>
+                                </p:cTn>
+                              </p:par>
+                            </p:childTnLst>
+                          </p:cTn>
+                        </p:par>
+                      </p:childTnLst>
+                    </p:cTn>
+                  </p:par>
+                  <p:par>
+                    <p:cTn id="8" fill="hold">
+                      <p:stCondLst>
+                        <p:cond delay="indefinite"/>
+                      </p:stCondLst>
+                      <p:childTnLst>
+                        <p:par>
+                          <p:cTn id="9" fill="hold">
+                            <p:stCondLst>
+                              <p:cond delay="0"/>
+                            </p:stCondLst>
+                            <p:childTnLst>
+                              <p:par>
+                                <p:cTn id="10" presetID="10" presetClass="entr" presetSubtype="0" fill="hold" grpId="0" nodeType="clickEffect">
+                                  <p:stCondLst>
+                                    <p:cond delay="0"/>
+                                  </p:stCondLst>
+                                  <p:childTnLst>
+                                    <p:set>
+                                      <p:cBhvr>
+                                        <p:cTn id="11" dur="1" fill="hold">
+                                          <p:stCondLst>
+                                            <p:cond delay="0"/>
+                                          </p:stCondLst>
+                                        </p:cTn>
+                                        <p:tgtEl>
+                                          <p:spTgt spid="5">
+                                            <p:txEl>
+                                              <p:pRg st="1" end="1"/>
+                                            </p:txEl>
+                                          </p:spTgt>
+                                        </p:tgtEl>
+                                        <p:attrNameLst>
+                                          <p:attrName>style.visibility</p:attrName>
+                                        </p:attrNameLst>
+                                      </p:cBhvr>
+                                      <p:to>
+                                        <p:strVal val="visible"/>
+                                      </p:to>
+                                    </p:set>
+                                    <p:animEffect transition="in" filter="fade">
+                                      <p:cBhvr>
+                                        <p:cTn id="12" dur="500"/>
+                                        <p:tgtEl>
+                                          <p:spTgt spid="5">
+                                            <p:txEl>
+                                              <p:pRg st="1" end="1"/>
+                                            </p:txEl>
+                                          </p:spTgt>
+                                        </p:tgtEl>
+                                      </p:cBhvr>
+                                    </p:animEffect>
+                                  </p:childTnLst>
+                                </p:cTn>
+                              </p:par>
+                            </p:childTnLst>
+                          </p:cTn>
+                        </p:par>
+                      </p:childTnLst>
+                    </p:cTn>
+                  </p:par>
+                </p:childTnLst>
+              </p:cTn>
+              <p:prevCondLst>
+                <p:cond evt="onPrev" delay="0">
+                  <p:tgtEl>
+                    <p:sldTgt/>
+                  </p:tgtEl>
+                </p:cond>
+              </p:prevCondLst>
+              <p:nextCondLst>
+                <p:cond evt="onNext" delay="0">
+                  <p:tgtEl>
+                    <p:sldTgt/>
+                  </p:tgtEl>
+                </p:cond>
+              </p:nextCondLst>
+            </p:seq>
+          </p:childTnLst>
+        </p:cTn>
+      </p:par>
+    </p:tnLst>
+    <p:bldLst>
+      <p:bldP spid="5" grpId="0" uiExpand="1" build="p"/>
+    </p:bldLst>
+  </p:timing>
+</p:sld>
+</file>
+
+<file path=ppt/slides/slide11.xml><?xml version="1.0" encoding="utf-8"?>
+<p:sld xmlns:a="http://schemas.openxmlformats.org/drawingml/2006/main" xmlns:r="http://schemas.openxmlformats.org/officeDocument/2006/relationships" xmlns:p="http://schemas.openxmlformats.org/presentationml/2006/main">
+  <p:cSld>
+    <p:spTree>
+      <p:nvGrpSpPr>
+        <p:cNvPr id="1" name=""/>
+        <p:cNvGrpSpPr/>
+        <p:nvPr/>
+      </p:nvGrpSpPr>
+      <p:grpSpPr>
+        <a:xfrm>
+          <a:off x="0" y="0"/>
+          <a:ext cx="0" cy="0"/>
+          <a:chOff x="0" y="0"/>
+          <a:chExt cx="0" cy="0"/>
+        </a:xfrm>
+      </p:grpSpPr>
+      <p:sp>
+        <p:nvSpPr>
+          <p:cNvPr id="3" name="Title 2"/>
+          <p:cNvSpPr>
+            <a:spLocks noGrp="1"/>
+          </p:cNvSpPr>
+          <p:nvPr>
+            <p:ph type="title"/>
+          </p:nvPr>
+        </p:nvSpPr>
+        <p:spPr/>
+        <p:txBody>
+          <a:bodyPr/>
+          <a:lstStyle/>
+          <a:p>
+            <a:r>
+              <a:rPr lang="en-GB" dirty="0" smtClean="0"/>
               <a:t>Current Work</a:t>
             </a:r>
             <a:endParaRPr lang="en-GB" dirty="0"/>
@@ -5006,7 +5273,7 @@
 </p:sld>
 </file>
 
-<file path=ppt/slides/slide11.xml><?xml version="1.0" encoding="utf-8"?>
+<file path=ppt/slides/slide12.xml><?xml version="1.0" encoding="utf-8"?>
 <p:sld xmlns:a="http://schemas.openxmlformats.org/drawingml/2006/main" xmlns:r="http://schemas.openxmlformats.org/officeDocument/2006/relationships" xmlns:p="http://schemas.openxmlformats.org/presentationml/2006/main">
   <p:cSld>
     <p:spTree>
@@ -5263,7 +5530,7 @@
 </p:sld>
 </file>
 
-<file path=ppt/slides/slide12.xml><?xml version="1.0" encoding="utf-8"?>
+<file path=ppt/slides/slide13.xml><?xml version="1.0" encoding="utf-8"?>
 <p:sld xmlns:a="http://schemas.openxmlformats.org/drawingml/2006/main" xmlns:r="http://schemas.openxmlformats.org/officeDocument/2006/relationships" xmlns:p="http://schemas.openxmlformats.org/presentationml/2006/main">
   <p:cSld>
     <p:spTree>
@@ -5347,7 +5614,7 @@
 </p:sld>
 </file>
 
-<file path=ppt/slides/slide13.xml><?xml version="1.0" encoding="utf-8"?>
+<file path=ppt/slides/slide14.xml><?xml version="1.0" encoding="utf-8"?>
 <p:sld xmlns:a="http://schemas.openxmlformats.org/drawingml/2006/main" xmlns:r="http://schemas.openxmlformats.org/officeDocument/2006/relationships" xmlns:p="http://schemas.openxmlformats.org/presentationml/2006/main">
   <p:cSld>
     <p:spTree>
@@ -5558,8 +5825,19 @@
           <a:p>
             <a:r>
               <a:rPr lang="en-GB" dirty="0" smtClean="0"/>
-              <a:t>The Computational Model;</a:t>
-            </a:r>
+              <a:t>The Computational Model</a:t>
+            </a:r>
+            <a:r>
+              <a:rPr lang="en-GB" dirty="0" smtClean="0"/>
+              <a:t>;</a:t>
+            </a:r>
+          </a:p>
+          <a:p>
+            <a:r>
+              <a:rPr lang="en-GB" dirty="0" smtClean="0"/>
+              <a:t>Task Allocation Model;</a:t>
+            </a:r>
+            <a:endParaRPr lang="en-GB" dirty="0" smtClean="0"/>
           </a:p>
           <a:p>
             <a:r>
@@ -7888,6 +8166,37 @@
       </p:grpSpPr>
       <p:sp>
         <p:nvSpPr>
+          <p:cNvPr id="2" name="Content Placeholder 1"/>
+          <p:cNvSpPr>
+            <a:spLocks noGrp="1"/>
+          </p:cNvSpPr>
+          <p:nvPr>
+            <p:ph idx="1"/>
+          </p:nvPr>
+        </p:nvSpPr>
+        <p:spPr>
+          <a:xfrm>
+            <a:off x="457200" y="1196753"/>
+            <a:ext cx="8229600" cy="4621634"/>
+          </a:xfrm>
+        </p:spPr>
+        <p:txBody>
+          <a:bodyPr>
+            <a:normAutofit/>
+          </a:bodyPr>
+          <a:lstStyle/>
+          <a:p>
+            <a:pPr>
+              <a:spcBef>
+                <a:spcPts val="2400"/>
+              </a:spcBef>
+            </a:pPr>
+            <a:endParaRPr lang="en-US" dirty="0"/>
+          </a:p>
+        </p:txBody>
+      </p:sp>
+      <p:sp>
+        <p:nvSpPr>
           <p:cNvPr id="3" name="Title 2"/>
           <p:cNvSpPr>
             <a:spLocks noGrp="1"/>
@@ -7903,62 +8212,7 @@
           <a:p>
             <a:r>
               <a:rPr lang="en-GB" dirty="0" smtClean="0"/>
-              <a:t>Proposed Experiment</a:t>
-            </a:r>
-            <a:endParaRPr lang="en-GB" dirty="0"/>
-          </a:p>
-        </p:txBody>
-      </p:sp>
-      <p:sp>
-        <p:nvSpPr>
-          <p:cNvPr id="5" name="Content Placeholder 4"/>
-          <p:cNvSpPr>
-            <a:spLocks noGrp="1"/>
-          </p:cNvSpPr>
-          <p:nvPr>
-            <p:ph idx="1"/>
-          </p:nvPr>
-        </p:nvSpPr>
-        <p:spPr/>
-        <p:txBody>
-          <a:bodyPr/>
-          <a:lstStyle/>
-          <a:p>
-            <a:pPr>
-              <a:spcBef>
-                <a:spcPts val="3000"/>
-              </a:spcBef>
-            </a:pPr>
-            <a:r>
-              <a:rPr lang="en-GB" b="1" dirty="0" smtClean="0"/>
-              <a:t>Objective: </a:t>
-            </a:r>
-            <a:r>
-              <a:rPr lang="en-GB" dirty="0"/>
-              <a:t>Investigate how information is propagated throughout the </a:t>
-            </a:r>
-            <a:r>
-              <a:rPr lang="en-GB" dirty="0" smtClean="0"/>
-              <a:t>colony.</a:t>
-            </a:r>
-          </a:p>
-          <a:p>
-            <a:pPr>
-              <a:spcBef>
-                <a:spcPts val="3000"/>
-              </a:spcBef>
-            </a:pPr>
-            <a:r>
-              <a:rPr lang="en-GB" b="1" dirty="0"/>
-              <a:t>Study case: </a:t>
-            </a:r>
-            <a:r>
-              <a:rPr lang="en-GB" dirty="0"/>
-              <a:t>addition of a predator near the colony nest after sometime of simulation</a:t>
-            </a:r>
-            <a:r>
-              <a:rPr lang="en-GB" dirty="0" smtClean="0"/>
-              <a:t>.</a:t>
+              <a:t>Task Allocation Model</a:t>
             </a:r>
             <a:endParaRPr lang="en-GB" dirty="0"/>
           </a:p>
@@ -7967,7 +8221,7 @@
     </p:spTree>
     <p:extLst>
       <p:ext uri="{BB962C8B-B14F-4D97-AF65-F5344CB8AC3E}">
-        <p14:creationId xmlns:p14="http://schemas.microsoft.com/office/powerpoint/2010/main" val="138210221"/>
+        <p14:creationId xmlns:p14="http://schemas.microsoft.com/office/powerpoint/2010/main" val="2688995473"/>
       </p:ext>
     </p:extLst>
   </p:cSld>
@@ -7998,10 +8252,15 @@
                             </p:stCondLst>
                             <p:childTnLst>
                               <p:par>
-                                <p:cTn id="5" presetID="10" presetClass="entr" presetSubtype="0" fill="hold" grpId="0" nodeType="afterEffect">
+                                <p:cTn id="5" presetID="10" presetClass="entr" presetSubtype="0" fill="hold" grpId="0" nodeType="afterEffect" nodePh="1">
                                   <p:stCondLst>
                                     <p:cond delay="0"/>
                                   </p:stCondLst>
+                                  <p:endCondLst>
+                                    <p:cond evt="begin" delay="0">
+                                      <p:tn val="5"/>
+                                    </p:cond>
+                                  </p:endCondLst>
                                   <p:childTnLst>
                                     <p:set>
                                       <p:cBhvr>
@@ -8011,7 +8270,7 @@
                                           </p:stCondLst>
                                         </p:cTn>
                                         <p:tgtEl>
-                                          <p:spTgt spid="5">
+                                          <p:spTgt spid="2">
                                             <p:txEl>
                                               <p:pRg st="0" end="0"/>
                                             </p:txEl>
@@ -8029,70 +8288,9 @@
                                       <p:cBhvr>
                                         <p:cTn id="7" dur="500"/>
                                         <p:tgtEl>
-                                          <p:spTgt spid="5">
+                                          <p:spTgt spid="2">
                                             <p:txEl>
                                               <p:pRg st="0" end="0"/>
-                                            </p:txEl>
-                                          </p:spTgt>
-                                        </p:tgtEl>
-                                      </p:cBhvr>
-                                    </p:animEffect>
-                                  </p:childTnLst>
-                                </p:cTn>
-                              </p:par>
-                            </p:childTnLst>
-                          </p:cTn>
-                        </p:par>
-                      </p:childTnLst>
-                    </p:cTn>
-                  </p:par>
-                  <p:par>
-                    <p:cTn id="8" fill="hold">
-                      <p:stCondLst>
-                        <p:cond delay="indefinite"/>
-                      </p:stCondLst>
-                      <p:childTnLst>
-                        <p:par>
-                          <p:cTn id="9" fill="hold">
-                            <p:stCondLst>
-                              <p:cond delay="0"/>
-                            </p:stCondLst>
-                            <p:childTnLst>
-                              <p:par>
-                                <p:cTn id="10" presetID="10" presetClass="entr" presetSubtype="0" fill="hold" grpId="0" nodeType="clickEffect">
-                                  <p:stCondLst>
-                                    <p:cond delay="0"/>
-                                  </p:stCondLst>
-                                  <p:childTnLst>
-                                    <p:set>
-                                      <p:cBhvr>
-                                        <p:cTn id="11" dur="1" fill="hold">
-                                          <p:stCondLst>
-                                            <p:cond delay="0"/>
-                                          </p:stCondLst>
-                                        </p:cTn>
-                                        <p:tgtEl>
-                                          <p:spTgt spid="5">
-                                            <p:txEl>
-                                              <p:pRg st="1" end="1"/>
-                                            </p:txEl>
-                                          </p:spTgt>
-                                        </p:tgtEl>
-                                        <p:attrNameLst>
-                                          <p:attrName>style.visibility</p:attrName>
-                                        </p:attrNameLst>
-                                      </p:cBhvr>
-                                      <p:to>
-                                        <p:strVal val="visible"/>
-                                      </p:to>
-                                    </p:set>
-                                    <p:animEffect transition="in" filter="fade">
-                                      <p:cBhvr>
-                                        <p:cTn id="12" dur="500"/>
-                                        <p:tgtEl>
-                                          <p:spTgt spid="5">
-                                            <p:txEl>
-                                              <p:pRg st="1" end="1"/>
                                             </p:txEl>
                                           </p:spTgt>
                                         </p:tgtEl>
@@ -8129,7 +8327,7 @@
       </p:par>
     </p:tnLst>
     <p:bldLst>
-      <p:bldP spid="5" grpId="0" uiExpand="1" build="p"/>
+      <p:bldP spid="2" grpId="0" build="p"/>
     </p:bldLst>
   </p:timing>
 </p:sld>

</xml_diff>

<commit_message>
Pheromone update basic implementation done. Presentation almost finished.
</commit_message>
<xml_diff>
--- a/presentation-june/Presentation.pptx
+++ b/presentation-june/Presentation.pptx
@@ -9,14 +9,14 @@
   </p:notesMasterIdLst>
   <p:sldIdLst>
     <p:sldId id="256" r:id="rId2"/>
-    <p:sldId id="257" r:id="rId3"/>
-    <p:sldId id="269" r:id="rId4"/>
-    <p:sldId id="259" r:id="rId5"/>
-    <p:sldId id="260" r:id="rId6"/>
-    <p:sldId id="261" r:id="rId7"/>
-    <p:sldId id="262" r:id="rId8"/>
-    <p:sldId id="263" r:id="rId9"/>
-    <p:sldId id="270" r:id="rId10"/>
+    <p:sldId id="269" r:id="rId3"/>
+    <p:sldId id="259" r:id="rId4"/>
+    <p:sldId id="260" r:id="rId5"/>
+    <p:sldId id="261" r:id="rId6"/>
+    <p:sldId id="262" r:id="rId7"/>
+    <p:sldId id="263" r:id="rId8"/>
+    <p:sldId id="270" r:id="rId9"/>
+    <p:sldId id="271" r:id="rId10"/>
     <p:sldId id="264" r:id="rId11"/>
     <p:sldId id="265" r:id="rId12"/>
     <p:sldId id="266" r:id="rId13"/>
@@ -126,7 +126,7 @@
 <file path=ppt/charts/chart1.xml><?xml version="1.0" encoding="utf-8"?>
 <c:chartSpace xmlns:c="http://schemas.openxmlformats.org/drawingml/2006/chart" xmlns:a="http://schemas.openxmlformats.org/drawingml/2006/main" xmlns:r="http://schemas.openxmlformats.org/officeDocument/2006/relationships">
   <c:date1904 val="0"/>
-  <c:lang val="en-GB"/>
+  <c:lang val="en-US"/>
   <c:roundedCorners val="0"/>
   <mc:AlternateContent xmlns:mc="http://schemas.openxmlformats.org/markup-compatibility/2006">
     <mc:Choice xmlns:c14="http://schemas.microsoft.com/office/drawing/2007/8/2/chart" Requires="c14">
@@ -292,10 +292,10 @@
                 <c:formatCode>General</c:formatCode>
                 <c:ptCount val="2"/>
                 <c:pt idx="0">
-                  <c:v>2</c:v>
+                  <c:v>2.0</c:v>
                 </c:pt>
                 <c:pt idx="1">
-                  <c:v>98</c:v>
+                  <c:v>98.0</c:v>
                 </c:pt>
               </c:numCache>
             </c:numRef>
@@ -335,7 +335,7 @@
 <file path=ppt/charts/chart2.xml><?xml version="1.0" encoding="utf-8"?>
 <c:chartSpace xmlns:c="http://schemas.openxmlformats.org/drawingml/2006/chart" xmlns:a="http://schemas.openxmlformats.org/drawingml/2006/main" xmlns:r="http://schemas.openxmlformats.org/officeDocument/2006/relationships">
   <c:date1904 val="0"/>
-  <c:lang val="en-GB"/>
+  <c:lang val="en-US"/>
   <c:roundedCorners val="0"/>
   <mc:AlternateContent xmlns:mc="http://schemas.openxmlformats.org/markup-compatibility/2006">
     <mc:Choice xmlns:c14="http://schemas.microsoft.com/office/drawing/2007/8/2/chart" Requires="c14">
@@ -501,10 +501,10 @@
                 <c:formatCode>General</c:formatCode>
                 <c:ptCount val="2"/>
                 <c:pt idx="0">
-                  <c:v>50</c:v>
+                  <c:v>50.0</c:v>
                 </c:pt>
                 <c:pt idx="1">
-                  <c:v>50</c:v>
+                  <c:v>50.0</c:v>
                 </c:pt>
               </c:numCache>
             </c:numRef>
@@ -633,7 +633,7 @@
           <a:p>
             <a:fld id="{D2D90C8E-9ABA-428A-AE3B-7180319A3F53}" type="datetimeFigureOut">
               <a:rPr lang="en-GB" smtClean="0"/>
-              <a:t>01/06/2012</a:t>
+              <a:t>05/06/2012</a:t>
             </a:fld>
             <a:endParaRPr lang="en-GB"/>
           </a:p>
@@ -966,7 +966,7 @@
           <a:p>
             <a:fld id="{359ABEBD-ED10-45EA-AD6C-D56FB4AE805F}" type="slidenum">
               <a:rPr lang="en-GB" smtClean="0"/>
-              <a:t>4</a:t>
+              <a:t>3</a:t>
             </a:fld>
             <a:endParaRPr lang="en-GB"/>
           </a:p>
@@ -1067,7 +1067,7 @@
           <a:p>
             <a:fld id="{359ABEBD-ED10-45EA-AD6C-D56FB4AE805F}" type="slidenum">
               <a:rPr lang="en-GB" smtClean="0"/>
-              <a:t>5</a:t>
+              <a:t>4</a:t>
             </a:fld>
             <a:endParaRPr lang="en-GB"/>
           </a:p>
@@ -1186,7 +1186,7 @@
           <a:p>
             <a:fld id="{359ABEBD-ED10-45EA-AD6C-D56FB4AE805F}" type="slidenum">
               <a:rPr lang="en-GB" smtClean="0"/>
-              <a:t>6</a:t>
+              <a:t>5</a:t>
             </a:fld>
             <a:endParaRPr lang="en-GB"/>
           </a:p>
@@ -1206,6 +1206,190 @@
 </file>
 
 <file path=ppt/notesSlides/notesSlide4.xml><?xml version="1.0" encoding="utf-8"?>
+<p:notes xmlns:a="http://schemas.openxmlformats.org/drawingml/2006/main" xmlns:r="http://schemas.openxmlformats.org/officeDocument/2006/relationships" xmlns:p="http://schemas.openxmlformats.org/presentationml/2006/main">
+  <p:cSld>
+    <p:spTree>
+      <p:nvGrpSpPr>
+        <p:cNvPr id="1" name=""/>
+        <p:cNvGrpSpPr/>
+        <p:nvPr/>
+      </p:nvGrpSpPr>
+      <p:grpSpPr>
+        <a:xfrm>
+          <a:off x="0" y="0"/>
+          <a:ext cx="0" cy="0"/>
+          <a:chOff x="0" y="0"/>
+          <a:chExt cx="0" cy="0"/>
+        </a:xfrm>
+      </p:grpSpPr>
+      <p:sp>
+        <p:nvSpPr>
+          <p:cNvPr id="2" name="Slide Image Placeholder 1"/>
+          <p:cNvSpPr>
+            <a:spLocks noGrp="1" noRot="1" noChangeAspect="1"/>
+          </p:cNvSpPr>
+          <p:nvPr>
+            <p:ph type="sldImg"/>
+          </p:nvPr>
+        </p:nvSpPr>
+        <p:spPr/>
+      </p:sp>
+      <p:sp>
+        <p:nvSpPr>
+          <p:cNvPr id="3" name="Notes Placeholder 2"/>
+          <p:cNvSpPr>
+            <a:spLocks noGrp="1"/>
+          </p:cNvSpPr>
+          <p:nvPr>
+            <p:ph type="body" idx="1"/>
+          </p:nvPr>
+        </p:nvSpPr>
+        <p:spPr/>
+        <p:txBody>
+          <a:bodyPr/>
+          <a:lstStyle/>
+          <a:p>
+            <a:r>
+              <a:rPr lang="en-GB" dirty="0" smtClean="0"/>
+              <a:t>Examples of stimulus: </a:t>
+            </a:r>
+            <a:r>
+              <a:rPr lang="en-GB" dirty="0" err="1" smtClean="0"/>
+              <a:t>antennation</a:t>
+            </a:r>
+            <a:endParaRPr lang="en-GB" dirty="0" smtClean="0"/>
+          </a:p>
+        </p:txBody>
+      </p:sp>
+      <p:sp>
+        <p:nvSpPr>
+          <p:cNvPr id="4" name="Slide Number Placeholder 3"/>
+          <p:cNvSpPr>
+            <a:spLocks noGrp="1"/>
+          </p:cNvSpPr>
+          <p:nvPr>
+            <p:ph type="sldNum" sz="quarter" idx="10"/>
+          </p:nvPr>
+        </p:nvSpPr>
+        <p:spPr/>
+        <p:txBody>
+          <a:bodyPr/>
+          <a:lstStyle/>
+          <a:p>
+            <a:fld id="{359ABEBD-ED10-45EA-AD6C-D56FB4AE805F}" type="slidenum">
+              <a:rPr lang="en-GB" smtClean="0"/>
+              <a:t>8</a:t>
+            </a:fld>
+            <a:endParaRPr lang="en-GB"/>
+          </a:p>
+        </p:txBody>
+      </p:sp>
+    </p:spTree>
+    <p:extLst>
+      <p:ext uri="{BB962C8B-B14F-4D97-AF65-F5344CB8AC3E}">
+        <p14:creationId xmlns:p14="http://schemas.microsoft.com/office/powerpoint/2010/main" val="3999587537"/>
+      </p:ext>
+    </p:extLst>
+  </p:cSld>
+  <p:clrMapOvr>
+    <a:masterClrMapping/>
+  </p:clrMapOvr>
+</p:notes>
+</file>
+
+<file path=ppt/notesSlides/notesSlide5.xml><?xml version="1.0" encoding="utf-8"?>
+<p:notes xmlns:a="http://schemas.openxmlformats.org/drawingml/2006/main" xmlns:r="http://schemas.openxmlformats.org/officeDocument/2006/relationships" xmlns:p="http://schemas.openxmlformats.org/presentationml/2006/main">
+  <p:cSld>
+    <p:spTree>
+      <p:nvGrpSpPr>
+        <p:cNvPr id="1" name=""/>
+        <p:cNvGrpSpPr/>
+        <p:nvPr/>
+      </p:nvGrpSpPr>
+      <p:grpSpPr>
+        <a:xfrm>
+          <a:off x="0" y="0"/>
+          <a:ext cx="0" cy="0"/>
+          <a:chOff x="0" y="0"/>
+          <a:chExt cx="0" cy="0"/>
+        </a:xfrm>
+      </p:grpSpPr>
+      <p:sp>
+        <p:nvSpPr>
+          <p:cNvPr id="2" name="Slide Image Placeholder 1"/>
+          <p:cNvSpPr>
+            <a:spLocks noGrp="1" noRot="1" noChangeAspect="1"/>
+          </p:cNvSpPr>
+          <p:nvPr>
+            <p:ph type="sldImg"/>
+          </p:nvPr>
+        </p:nvSpPr>
+        <p:spPr/>
+      </p:sp>
+      <p:sp>
+        <p:nvSpPr>
+          <p:cNvPr id="3" name="Notes Placeholder 2"/>
+          <p:cNvSpPr>
+            <a:spLocks noGrp="1"/>
+          </p:cNvSpPr>
+          <p:nvPr>
+            <p:ph type="body" idx="1"/>
+          </p:nvPr>
+        </p:nvSpPr>
+        <p:spPr/>
+        <p:txBody>
+          <a:bodyPr/>
+          <a:lstStyle/>
+          <a:p>
+            <a:r>
+              <a:rPr lang="en-GB" dirty="0" smtClean="0"/>
+              <a:t>Examples of stimulus: </a:t>
+            </a:r>
+            <a:r>
+              <a:rPr lang="en-GB" smtClean="0"/>
+              <a:t>antennation</a:t>
+            </a:r>
+            <a:endParaRPr lang="en-GB" dirty="0" smtClean="0"/>
+          </a:p>
+        </p:txBody>
+      </p:sp>
+      <p:sp>
+        <p:nvSpPr>
+          <p:cNvPr id="4" name="Slide Number Placeholder 3"/>
+          <p:cNvSpPr>
+            <a:spLocks noGrp="1"/>
+          </p:cNvSpPr>
+          <p:nvPr>
+            <p:ph type="sldNum" sz="quarter" idx="10"/>
+          </p:nvPr>
+        </p:nvSpPr>
+        <p:spPr/>
+        <p:txBody>
+          <a:bodyPr/>
+          <a:lstStyle/>
+          <a:p>
+            <a:fld id="{359ABEBD-ED10-45EA-AD6C-D56FB4AE805F}" type="slidenum">
+              <a:rPr lang="en-GB" smtClean="0"/>
+              <a:t>9</a:t>
+            </a:fld>
+            <a:endParaRPr lang="en-GB"/>
+          </a:p>
+        </p:txBody>
+      </p:sp>
+    </p:spTree>
+    <p:extLst>
+      <p:ext uri="{BB962C8B-B14F-4D97-AF65-F5344CB8AC3E}">
+        <p14:creationId xmlns:p14="http://schemas.microsoft.com/office/powerpoint/2010/main" val="3999587537"/>
+      </p:ext>
+    </p:extLst>
+  </p:cSld>
+  <p:clrMapOvr>
+    <a:masterClrMapping/>
+  </p:clrMapOvr>
+</p:notes>
+</file>
+
+<file path=ppt/notesSlides/notesSlide6.xml><?xml version="1.0" encoding="utf-8"?>
 <p:notes xmlns:a="http://schemas.openxmlformats.org/drawingml/2006/main" xmlns:r="http://schemas.openxmlformats.org/officeDocument/2006/relationships" xmlns:p="http://schemas.openxmlformats.org/presentationml/2006/main">
   <p:cSld>
     <p:spTree>
@@ -1524,7 +1708,7 @@
           <a:p>
             <a:fld id="{70186140-57E4-4B6F-BB49-D5C1E28E250A}" type="datetimeFigureOut">
               <a:rPr lang="en-GB" smtClean="0"/>
-              <a:t>01/06/2012</a:t>
+              <a:t>05/06/2012</a:t>
             </a:fld>
             <a:endParaRPr lang="en-GB"/>
           </a:p>
@@ -1585,7 +1769,7 @@
   <p:timing>
     <p:tnLst>
       <p:par>
-        <p:cTn id="1" dur="indefinite" restart="never" nodeType="tmRoot"/>
+        <p:cTn xmlns:p14="http://schemas.microsoft.com/office/powerpoint/2010/main" id="1" dur="indefinite" restart="never" nodeType="tmRoot"/>
       </p:par>
     </p:tnLst>
   </p:timing>
@@ -1701,7 +1885,7 @@
           <a:p>
             <a:fld id="{70186140-57E4-4B6F-BB49-D5C1E28E250A}" type="datetimeFigureOut">
               <a:rPr lang="en-GB" smtClean="0"/>
-              <a:t>01/06/2012</a:t>
+              <a:t>05/06/2012</a:t>
             </a:fld>
             <a:endParaRPr lang="en-GB"/>
           </a:p>
@@ -1881,7 +2065,7 @@
           <a:p>
             <a:fld id="{70186140-57E4-4B6F-BB49-D5C1E28E250A}" type="datetimeFigureOut">
               <a:rPr lang="en-GB" smtClean="0"/>
-              <a:t>01/06/2012</a:t>
+              <a:t>05/06/2012</a:t>
             </a:fld>
             <a:endParaRPr lang="en-GB"/>
           </a:p>
@@ -2063,7 +2247,7 @@
           <a:p>
             <a:fld id="{70186140-57E4-4B6F-BB49-D5C1E28E250A}" type="datetimeFigureOut">
               <a:rPr lang="en-GB" smtClean="0"/>
-              <a:t>01/06/2012</a:t>
+              <a:t>05/06/2012</a:t>
             </a:fld>
             <a:endParaRPr lang="en-GB"/>
           </a:p>
@@ -2170,7 +2354,7 @@
   <p:timing>
     <p:tnLst>
       <p:par>
-        <p:cTn id="1" dur="indefinite" restart="never" nodeType="tmRoot"/>
+        <p:cTn xmlns:p14="http://schemas.microsoft.com/office/powerpoint/2010/main" id="1" dur="indefinite" restart="never" nodeType="tmRoot"/>
       </p:par>
     </p:tnLst>
   </p:timing>
@@ -2362,7 +2546,7 @@
           <a:p>
             <a:fld id="{70186140-57E4-4B6F-BB49-D5C1E28E250A}" type="datetimeFigureOut">
               <a:rPr lang="en-GB" smtClean="0"/>
-              <a:t>01/06/2012</a:t>
+              <a:t>05/06/2012</a:t>
             </a:fld>
             <a:endParaRPr lang="en-GB"/>
           </a:p>
@@ -2650,7 +2834,7 @@
           <a:p>
             <a:fld id="{70186140-57E4-4B6F-BB49-D5C1E28E250A}" type="datetimeFigureOut">
               <a:rPr lang="en-GB" smtClean="0"/>
-              <a:t>01/06/2012</a:t>
+              <a:t>05/06/2012</a:t>
             </a:fld>
             <a:endParaRPr lang="en-GB"/>
           </a:p>
@@ -3072,7 +3256,7 @@
           <a:p>
             <a:fld id="{70186140-57E4-4B6F-BB49-D5C1E28E250A}" type="datetimeFigureOut">
               <a:rPr lang="en-GB" smtClean="0"/>
-              <a:t>01/06/2012</a:t>
+              <a:t>05/06/2012</a:t>
             </a:fld>
             <a:endParaRPr lang="en-GB"/>
           </a:p>
@@ -3190,7 +3374,7 @@
           <a:p>
             <a:fld id="{70186140-57E4-4B6F-BB49-D5C1E28E250A}" type="datetimeFigureOut">
               <a:rPr lang="en-GB" smtClean="0"/>
-              <a:t>01/06/2012</a:t>
+              <a:t>05/06/2012</a:t>
             </a:fld>
             <a:endParaRPr lang="en-GB"/>
           </a:p>
@@ -3285,7 +3469,7 @@
           <a:p>
             <a:fld id="{70186140-57E4-4B6F-BB49-D5C1E28E250A}" type="datetimeFigureOut">
               <a:rPr lang="en-GB" smtClean="0"/>
-              <a:t>01/06/2012</a:t>
+              <a:t>05/06/2012</a:t>
             </a:fld>
             <a:endParaRPr lang="en-GB"/>
           </a:p>
@@ -3562,7 +3746,7 @@
           <a:p>
             <a:fld id="{70186140-57E4-4B6F-BB49-D5C1E28E250A}" type="datetimeFigureOut">
               <a:rPr lang="en-GB" smtClean="0"/>
-              <a:t>01/06/2012</a:t>
+              <a:t>05/06/2012</a:t>
             </a:fld>
             <a:endParaRPr lang="en-GB"/>
           </a:p>
@@ -3815,7 +3999,7 @@
           <a:p>
             <a:fld id="{70186140-57E4-4B6F-BB49-D5C1E28E250A}" type="datetimeFigureOut">
               <a:rPr lang="en-GB" smtClean="0"/>
-              <a:t>01/06/2012</a:t>
+              <a:t>05/06/2012</a:t>
             </a:fld>
             <a:endParaRPr lang="en-GB"/>
           </a:p>
@@ -4028,7 +4212,7 @@
           <a:p>
             <a:fld id="{70186140-57E4-4B6F-BB49-D5C1E28E250A}" type="datetimeFigureOut">
               <a:rPr lang="en-GB" smtClean="0"/>
-              <a:t>01/06/2012</a:t>
+              <a:t>05/06/2012</a:t>
             </a:fld>
             <a:endParaRPr lang="en-GB"/>
           </a:p>
@@ -4136,7 +4320,7 @@
   <p:timing>
     <p:tnLst>
       <p:par>
-        <p:cTn id="1" dur="indefinite" restart="never" nodeType="tmRoot"/>
+        <p:cTn xmlns:p14="http://schemas.microsoft.com/office/powerpoint/2010/main" id="1" dur="indefinite" restart="never" nodeType="tmRoot"/>
       </p:par>
     </p:tnLst>
   </p:timing>
@@ -4418,8 +4602,8 @@
         </p:nvSpPr>
         <p:spPr>
           <a:xfrm>
-            <a:off x="6084168" y="5733256"/>
-            <a:ext cx="2664296" cy="720080"/>
+            <a:off x="1043608" y="5517232"/>
+            <a:ext cx="2736304" cy="792088"/>
           </a:xfrm>
           <a:prstGeom prst="roundRect">
             <a:avLst>
@@ -4468,16 +4652,26 @@
           </a:p>
           <a:p>
             <a:r>
-              <a:rPr lang="en-GB" sz="1600" dirty="0" smtClean="0">
+              <a:rPr lang="en-GB" sz="1600" dirty="0" err="1" smtClean="0">
                 <a:solidFill>
                   <a:schemeClr val="accent5">
                     <a:lumMod val="75000"/>
                   </a:schemeClr>
                 </a:solidFill>
               </a:rPr>
-              <a:t>luiz_filipe.abrahao@kcl.ac.uk</a:t>
-            </a:r>
-            <a:endParaRPr lang="en-GB" sz="1600" dirty="0">
+              <a:t>luiz_filipe.abrahao@</a:t>
+            </a:r>
+            <a:r>
+              <a:rPr lang="en-GB" sz="1600" dirty="0" err="1" smtClean="0">
+                <a:solidFill>
+                  <a:schemeClr val="accent5">
+                    <a:lumMod val="75000"/>
+                  </a:schemeClr>
+                </a:solidFill>
+              </a:rPr>
+              <a:t>kcl.ac.uk</a:t>
+            </a:r>
+            <a:endParaRPr lang="en-GB" sz="1600" dirty="0" smtClean="0">
               <a:solidFill>
                 <a:schemeClr val="accent5">
                   <a:lumMod val="75000"/>
@@ -4552,14 +4746,14 @@
           </a:ln>
           <a:effectLst/>
           <a:extLst>
-            <a:ext uri="{909E8E84-426E-40DD-AFC4-6F175D3DCCD1}">
+            <a:ext uri="{909E8E84-426E-40dd-AFC4-6F175D3DCCD1}">
               <a14:hiddenFill xmlns:a14="http://schemas.microsoft.com/office/drawing/2010/main">
                 <a:solidFill>
                   <a:schemeClr val="accent1"/>
                 </a:solidFill>
               </a14:hiddenFill>
             </a:ext>
-            <a:ext uri="{91240B29-F687-4F45-9708-019B960494DF}">
+            <a:ext uri="{91240B29-F687-4f45-9708-019B960494DF}">
               <a14:hiddenLine xmlns:a14="http://schemas.microsoft.com/office/drawing/2010/main" w="9525">
                 <a:solidFill>
                   <a:schemeClr val="tx1"/>
@@ -4569,7 +4763,7 @@
                 <a:tailEnd/>
               </a14:hiddenLine>
             </a:ext>
-            <a:ext uri="{AF507438-7753-43E0-B8FC-AC1667EBCBE1}">
+            <a:ext uri="{AF507438-7753-43e0-B8FC-AC1667EBCBE1}">
               <a14:hiddenEffects xmlns:a14="http://schemas.microsoft.com/office/drawing/2010/main">
                 <a:effectLst>
                   <a:outerShdw dist="35921" dir="2700000" algn="ctr" rotWithShape="0">
@@ -4581,6 +4775,170 @@
           </a:extLst>
         </p:spPr>
       </p:pic>
+      <p:sp>
+        <p:nvSpPr>
+          <p:cNvPr id="6" name="Rounded Rectangle 5"/>
+          <p:cNvSpPr/>
+          <p:nvPr/>
+        </p:nvSpPr>
+        <p:spPr>
+          <a:xfrm>
+            <a:off x="3923928" y="5517232"/>
+            <a:ext cx="4104456" cy="792088"/>
+          </a:xfrm>
+          <a:prstGeom prst="roundRect">
+            <a:avLst>
+              <a:gd name="adj" fmla="val 7173"/>
+            </a:avLst>
+          </a:prstGeom>
+          <a:solidFill>
+            <a:srgbClr val="31859C">
+              <a:alpha val="18824"/>
+            </a:srgbClr>
+          </a:solidFill>
+          <a:ln>
+            <a:noFill/>
+          </a:ln>
+        </p:spPr>
+        <p:style>
+          <a:lnRef idx="2">
+            <a:schemeClr val="accent1">
+              <a:shade val="50000"/>
+            </a:schemeClr>
+          </a:lnRef>
+          <a:fillRef idx="1">
+            <a:schemeClr val="accent1"/>
+          </a:fillRef>
+          <a:effectRef idx="0">
+            <a:schemeClr val="accent1"/>
+          </a:effectRef>
+          <a:fontRef idx="minor">
+            <a:schemeClr val="lt1"/>
+          </a:fontRef>
+        </p:style>
+        <p:txBody>
+          <a:bodyPr rtlCol="0" anchor="ctr"/>
+          <a:lstStyle/>
+          <a:p>
+            <a:r>
+              <a:rPr lang="en-GB" sz="1600" dirty="0" smtClean="0">
+                <a:solidFill>
+                  <a:schemeClr val="accent5">
+                    <a:lumMod val="75000"/>
+                  </a:schemeClr>
+                </a:solidFill>
+              </a:rPr>
+              <a:t>First Supervisor</a:t>
+            </a:r>
+            <a:r>
+              <a:rPr lang="en-GB" sz="1600" dirty="0">
+                <a:solidFill>
+                  <a:schemeClr val="accent5">
+                    <a:lumMod val="75000"/>
+                  </a:schemeClr>
+                </a:solidFill>
+              </a:rPr>
+              <a:t>: Dr </a:t>
+            </a:r>
+            <a:r>
+              <a:rPr lang="en-GB" sz="1600" dirty="0" err="1">
+                <a:solidFill>
+                  <a:schemeClr val="accent5">
+                    <a:lumMod val="75000"/>
+                  </a:schemeClr>
+                </a:solidFill>
+              </a:rPr>
+              <a:t>Thrishantha</a:t>
+            </a:r>
+            <a:r>
+              <a:rPr lang="en-GB" sz="1600" dirty="0">
+                <a:solidFill>
+                  <a:schemeClr val="accent5">
+                    <a:lumMod val="75000"/>
+                  </a:schemeClr>
+                </a:solidFill>
+              </a:rPr>
+              <a:t> </a:t>
+            </a:r>
+            <a:r>
+              <a:rPr lang="en-GB" sz="1600" dirty="0" err="1" smtClean="0">
+                <a:solidFill>
+                  <a:schemeClr val="accent5">
+                    <a:lumMod val="75000"/>
+                  </a:schemeClr>
+                </a:solidFill>
+              </a:rPr>
+              <a:t>Nanayakkara</a:t>
+            </a:r>
+            <a:endParaRPr lang="en-GB" sz="1600" dirty="0" smtClean="0">
+              <a:solidFill>
+                <a:schemeClr val="accent5">
+                  <a:lumMod val="75000"/>
+                </a:schemeClr>
+              </a:solidFill>
+            </a:endParaRPr>
+          </a:p>
+          <a:p>
+            <a:r>
+              <a:rPr lang="en-GB" sz="1600" dirty="0" smtClean="0">
+                <a:solidFill>
+                  <a:schemeClr val="accent5">
+                    <a:lumMod val="75000"/>
+                  </a:schemeClr>
+                </a:solidFill>
+              </a:rPr>
+              <a:t>Second supervisor</a:t>
+            </a:r>
+            <a:r>
+              <a:rPr lang="en-GB" sz="1600" dirty="0">
+                <a:solidFill>
+                  <a:schemeClr val="accent5">
+                    <a:lumMod val="75000"/>
+                  </a:schemeClr>
+                </a:solidFill>
+              </a:rPr>
+              <a:t>: Professor </a:t>
+            </a:r>
+            <a:r>
+              <a:rPr lang="en-GB" sz="1600" dirty="0" err="1">
+                <a:solidFill>
+                  <a:schemeClr val="accent5">
+                    <a:lumMod val="75000"/>
+                  </a:schemeClr>
+                </a:solidFill>
+              </a:rPr>
+              <a:t>Kaspar</a:t>
+            </a:r>
+            <a:r>
+              <a:rPr lang="en-GB" sz="1600" dirty="0">
+                <a:solidFill>
+                  <a:schemeClr val="accent5">
+                    <a:lumMod val="75000"/>
+                  </a:schemeClr>
+                </a:solidFill>
+              </a:rPr>
+              <a:t> </a:t>
+            </a:r>
+            <a:r>
+              <a:rPr lang="en-GB" sz="1600" dirty="0" err="1" smtClean="0">
+                <a:solidFill>
+                  <a:schemeClr val="accent5">
+                    <a:lumMod val="75000"/>
+                  </a:schemeClr>
+                </a:solidFill>
+              </a:rPr>
+              <a:t>Althoefer</a:t>
+            </a:r>
+            <a:endParaRPr lang="en-GB" sz="1600" dirty="0">
+              <a:solidFill>
+                <a:schemeClr val="accent5">
+                  <a:lumMod val="75000"/>
+                </a:schemeClr>
+              </a:solidFill>
+            </a:endParaRPr>
+          </a:p>
+        </p:txBody>
+      </p:sp>
     </p:spTree>
     <p:extLst>
       <p:ext uri="{BB962C8B-B14F-4D97-AF65-F5344CB8AC3E}">
@@ -4594,7 +4952,7 @@
   <p:timing>
     <p:tnLst>
       <p:par>
-        <p:cTn id="1" dur="indefinite" restart="never" nodeType="tmRoot"/>
+        <p:cTn xmlns:p14="http://schemas.microsoft.com/office/powerpoint/2010/main" id="1" dur="indefinite" restart="never" nodeType="tmRoot"/>
       </p:par>
     </p:tnLst>
   </p:timing>
@@ -4709,7 +5067,7 @@
   <p:timing>
     <p:tnLst>
       <p:par>
-        <p:cTn id="1" dur="indefinite" restart="never" nodeType="tmRoot">
+        <p:cTn xmlns:p14="http://schemas.microsoft.com/office/powerpoint/2010/main" id="1" dur="indefinite" restart="never" nodeType="tmRoot">
           <p:childTnLst>
             <p:seq concurrent="1" nextAc="seek">
               <p:cTn id="2" dur="indefinite" nodeType="mainSeq">
@@ -4993,7 +5351,7 @@
   <p:timing>
     <p:tnLst>
       <p:par>
-        <p:cTn id="1" dur="indefinite" restart="never" nodeType="tmRoot">
+        <p:cTn xmlns:p14="http://schemas.microsoft.com/office/powerpoint/2010/main" id="1" dur="indefinite" restart="never" nodeType="tmRoot">
           <p:childTnLst>
             <p:seq concurrent="1" nextAc="seek">
               <p:cTn id="2" dur="indefinite" nodeType="mainSeq">
@@ -5340,12 +5698,8 @@
               </a:spcBef>
             </a:pPr>
             <a:r>
-              <a:rPr lang="en-GB" dirty="0"/>
-              <a:t>It is very hard to encode the ants behaviours into well defined </a:t>
-            </a:r>
-            <a:r>
               <a:rPr lang="en-GB" dirty="0" smtClean="0"/>
-              <a:t>tasks;</a:t>
+              <a:t>Pheromone trail updates need to be local, how to implement?</a:t>
             </a:r>
             <a:endParaRPr lang="en-GB" dirty="0"/>
           </a:p>
@@ -5355,6 +5709,14 @@
                 <a:spcPts val="3000"/>
               </a:spcBef>
             </a:pPr>
+            <a:r>
+              <a:rPr lang="en-GB" dirty="0" smtClean="0"/>
+              <a:t>Data </a:t>
+            </a:r>
+            <a:r>
+              <a:rPr lang="en-GB" dirty="0" smtClean="0"/>
+              <a:t>output and processing.</a:t>
+            </a:r>
             <a:endParaRPr lang="en-GB" dirty="0"/>
           </a:p>
         </p:txBody>
@@ -5372,7 +5734,7 @@
   <p:timing>
     <p:tnLst>
       <p:par>
-        <p:cTn id="1" dur="indefinite" restart="never" nodeType="tmRoot">
+        <p:cTn xmlns:p14="http://schemas.microsoft.com/office/powerpoint/2010/main" id="1" dur="indefinite" restart="never" nodeType="tmRoot">
           <p:childTnLst>
             <p:seq concurrent="1" nextAc="seek">
               <p:cTn id="2" dur="indefinite" nodeType="mainSeq">
@@ -5502,6 +5864,67 @@
                       </p:childTnLst>
                     </p:cTn>
                   </p:par>
+                  <p:par>
+                    <p:cTn id="13" fill="hold">
+                      <p:stCondLst>
+                        <p:cond delay="indefinite"/>
+                      </p:stCondLst>
+                      <p:childTnLst>
+                        <p:par>
+                          <p:cTn id="14" fill="hold">
+                            <p:stCondLst>
+                              <p:cond delay="0"/>
+                            </p:stCondLst>
+                            <p:childTnLst>
+                              <p:par>
+                                <p:cTn id="15" presetID="10" presetClass="entr" presetSubtype="0" fill="hold" grpId="0" nodeType="clickEffect">
+                                  <p:stCondLst>
+                                    <p:cond delay="0"/>
+                                  </p:stCondLst>
+                                  <p:childTnLst>
+                                    <p:set>
+                                      <p:cBhvr>
+                                        <p:cTn id="16" dur="1" fill="hold">
+                                          <p:stCondLst>
+                                            <p:cond delay="0"/>
+                                          </p:stCondLst>
+                                        </p:cTn>
+                                        <p:tgtEl>
+                                          <p:spTgt spid="5">
+                                            <p:txEl>
+                                              <p:pRg st="2" end="2"/>
+                                            </p:txEl>
+                                          </p:spTgt>
+                                        </p:tgtEl>
+                                        <p:attrNameLst>
+                                          <p:attrName>style.visibility</p:attrName>
+                                        </p:attrNameLst>
+                                      </p:cBhvr>
+                                      <p:to>
+                                        <p:strVal val="visible"/>
+                                      </p:to>
+                                    </p:set>
+                                    <p:animEffect transition="in" filter="fade">
+                                      <p:cBhvr>
+                                        <p:cTn id="17" dur="500"/>
+                                        <p:tgtEl>
+                                          <p:spTgt spid="5">
+                                            <p:txEl>
+                                              <p:pRg st="2" end="2"/>
+                                            </p:txEl>
+                                          </p:spTgt>
+                                        </p:tgtEl>
+                                      </p:cBhvr>
+                                    </p:animEffect>
+                                  </p:childTnLst>
+                                </p:cTn>
+                              </p:par>
+                            </p:childTnLst>
+                          </p:cTn>
+                        </p:par>
+                      </p:childTnLst>
+                    </p:cTn>
+                  </p:par>
                 </p:childTnLst>
               </p:cTn>
               <p:prevCondLst>
@@ -5557,7 +5980,12 @@
             <p:ph type="title"/>
           </p:nvPr>
         </p:nvSpPr>
-        <p:spPr/>
+        <p:spPr>
+          <a:xfrm>
+            <a:off x="323528" y="188640"/>
+            <a:ext cx="8229600" cy="778098"/>
+          </a:xfrm>
+        </p:spPr>
         <p:txBody>
           <a:bodyPr/>
           <a:lstStyle/>
@@ -5570,30 +5998,49 @@
           </a:p>
         </p:txBody>
       </p:sp>
-      <p:sp>
-        <p:nvSpPr>
-          <p:cNvPr id="5" name="Content Placeholder 4"/>
-          <p:cNvSpPr>
-            <a:spLocks noGrp="1"/>
-          </p:cNvSpPr>
-          <p:nvPr>
-            <p:ph idx="1"/>
-          </p:nvPr>
-        </p:nvSpPr>
-        <p:spPr/>
-        <p:txBody>
-          <a:bodyPr/>
-          <a:lstStyle/>
-          <a:p>
-            <a:pPr>
-              <a:spcBef>
-                <a:spcPts val="3000"/>
-              </a:spcBef>
-            </a:pPr>
-            <a:endParaRPr lang="en-GB" dirty="0"/>
-          </a:p>
-        </p:txBody>
-      </p:sp>
+      <p:pic>
+        <p:nvPicPr>
+          <p:cNvPr id="8" name="Picture 7" descr="MSc Project.png"/>
+          <p:cNvPicPr>
+            <a:picLocks noChangeAspect="1"/>
+          </p:cNvPicPr>
+          <p:nvPr/>
+        </p:nvPicPr>
+        <p:blipFill>
+          <a:blip r:embed="rId2">
+            <a:extLst>
+              <a:ext uri="{28A0092B-C50C-407E-A947-70E740481C1C}">
+                <a14:useLocalDpi xmlns:a14="http://schemas.microsoft.com/office/drawing/2010/main" val="0"/>
+              </a:ext>
+            </a:extLst>
+          </a:blip>
+          <a:stretch>
+            <a:fillRect/>
+          </a:stretch>
+        </p:blipFill>
+        <p:spPr>
+          <a:xfrm>
+            <a:off x="107504" y="1340768"/>
+            <a:ext cx="8892480" cy="3479666"/>
+          </a:xfrm>
+          <a:prstGeom prst="roundRect">
+            <a:avLst>
+              <a:gd name="adj" fmla="val 4636"/>
+            </a:avLst>
+          </a:prstGeom>
+          <a:solidFill>
+            <a:srgbClr val="FFFFFF">
+              <a:shade val="85000"/>
+            </a:srgbClr>
+          </a:solidFill>
+          <a:ln>
+            <a:noFill/>
+          </a:ln>
+          <a:effectLst>
+            <a:reflection blurRad="12700" stA="38000" endPos="28000" dist="5000" dir="5400000" sy="-100000" algn="bl" rotWithShape="0"/>
+          </a:effectLst>
+        </p:spPr>
+      </p:pic>
     </p:spTree>
     <p:extLst>
       <p:ext uri="{BB962C8B-B14F-4D97-AF65-F5344CB8AC3E}">
@@ -5607,7 +6054,7 @@
   <p:timing>
     <p:tnLst>
       <p:par>
-        <p:cTn id="1" dur="indefinite" restart="never" nodeType="tmRoot"/>
+        <p:cTn xmlns:p14="http://schemas.microsoft.com/office/powerpoint/2010/main" id="1" dur="indefinite" restart="never" nodeType="tmRoot"/>
       </p:par>
     </p:tnLst>
   </p:timing>
@@ -5639,10 +6086,10 @@
         </p:nvGrpSpPr>
         <p:grpSpPr>
           <a:xfrm>
-            <a:off x="3059832" y="1988840"/>
-            <a:ext cx="2493996" cy="2448587"/>
-            <a:chOff x="3540125" y="2055721"/>
-            <a:chExt cx="2493996" cy="2448587"/>
+            <a:off x="3059832" y="1289018"/>
+            <a:ext cx="2493996" cy="3148409"/>
+            <a:chOff x="3540125" y="1355899"/>
+            <a:chExt cx="2493996" cy="3148409"/>
           </a:xfrm>
         </p:grpSpPr>
         <p:pic>
@@ -5688,7 +6135,7 @@
               <a:noFill/>
             </a:ln>
             <a:extLst>
-              <a:ext uri="{909E8E84-426E-40DD-AFC4-6F175D3DCCD1}">
+              <a:ext uri="{909E8E84-426E-40dd-AFC4-6F175D3DCCD1}">
                 <a14:hiddenFill xmlns:a14="http://schemas.microsoft.com/office/drawing/2010/main">
                   <a:solidFill>
                     <a:srgbClr val="FFFFFF"/>
@@ -5706,8 +6153,8 @@
           </p:nvSpPr>
           <p:spPr>
             <a:xfrm rot="900000">
-              <a:off x="4504119" y="2055721"/>
-              <a:ext cx="707245" cy="1446550"/>
+              <a:off x="4529858" y="1355899"/>
+              <a:ext cx="1004715" cy="2215991"/>
             </a:xfrm>
             <a:prstGeom prst="rect">
               <a:avLst/>
@@ -5721,10 +6168,18 @@
             <a:lstStyle/>
             <a:p>
               <a:r>
-                <a:rPr lang="en-GB" sz="8800" dirty="0" smtClean="0"/>
+                <a:rPr lang="en-GB" sz="13800" dirty="0" smtClean="0">
+                  <a:solidFill>
+                    <a:srgbClr val="77933C"/>
+                  </a:solidFill>
+                </a:rPr>
                 <a:t>?</a:t>
               </a:r>
-              <a:endParaRPr lang="en-GB" sz="8800" dirty="0"/>
+              <a:endParaRPr lang="en-GB" sz="13800" dirty="0">
+                <a:solidFill>
+                  <a:srgbClr val="77933C"/>
+                </a:solidFill>
+              </a:endParaRPr>
             </a:p>
           </p:txBody>
         </p:sp>
@@ -5751,10 +6206,22 @@
             <a:lstStyle/>
             <a:p>
               <a:r>
-                <a:rPr lang="en-GB" sz="8800" dirty="0" smtClean="0"/>
+                <a:rPr lang="en-GB" sz="8800" dirty="0" smtClean="0">
+                  <a:solidFill>
+                    <a:schemeClr val="accent3">
+                      <a:lumMod val="75000"/>
+                    </a:schemeClr>
+                  </a:solidFill>
+                </a:rPr>
                 <a:t>?</a:t>
               </a:r>
-              <a:endParaRPr lang="en-GB" sz="8800" dirty="0"/>
+              <a:endParaRPr lang="en-GB" sz="8800" dirty="0">
+                <a:solidFill>
+                  <a:schemeClr val="accent3">
+                    <a:lumMod val="75000"/>
+                  </a:schemeClr>
+                </a:solidFill>
+              </a:endParaRPr>
             </a:p>
           </p:txBody>
         </p:sp>
@@ -5772,7 +6239,7 @@
   <p:timing>
     <p:tnLst>
       <p:par>
-        <p:cTn id="1" dur="indefinite" restart="never" nodeType="tmRoot"/>
+        <p:cTn xmlns:p14="http://schemas.microsoft.com/office/powerpoint/2010/main" id="1" dur="indefinite" restart="never" nodeType="tmRoot"/>
       </p:par>
     </p:tnLst>
   </p:timing>
@@ -5811,130 +6278,6 @@
           <a:bodyPr/>
           <a:lstStyle/>
           <a:p>
-            <a:r>
-              <a:rPr lang="en-GB" dirty="0" smtClean="0"/>
-              <a:t>Motivation;</a:t>
-            </a:r>
-          </a:p>
-          <a:p>
-            <a:r>
-              <a:rPr lang="en-GB" dirty="0" smtClean="0"/>
-              <a:t>Objectives;</a:t>
-            </a:r>
-          </a:p>
-          <a:p>
-            <a:r>
-              <a:rPr lang="en-GB" dirty="0" smtClean="0"/>
-              <a:t>The Computational Model</a:t>
-            </a:r>
-            <a:r>
-              <a:rPr lang="en-GB" dirty="0" smtClean="0"/>
-              <a:t>;</a:t>
-            </a:r>
-          </a:p>
-          <a:p>
-            <a:r>
-              <a:rPr lang="en-GB" dirty="0" smtClean="0"/>
-              <a:t>Task Allocation Model;</a:t>
-            </a:r>
-            <a:endParaRPr lang="en-GB" dirty="0" smtClean="0"/>
-          </a:p>
-          <a:p>
-            <a:r>
-              <a:rPr lang="en-GB" dirty="0" smtClean="0"/>
-              <a:t>Proposed Experiment;</a:t>
-            </a:r>
-          </a:p>
-          <a:p>
-            <a:r>
-              <a:rPr lang="en-GB" dirty="0" smtClean="0"/>
-              <a:t>Challenges;</a:t>
-            </a:r>
-          </a:p>
-          <a:p>
-            <a:r>
-              <a:rPr lang="en-GB" dirty="0" smtClean="0"/>
-              <a:t>Planning.</a:t>
-            </a:r>
-            <a:endParaRPr lang="en-GB" dirty="0"/>
-          </a:p>
-        </p:txBody>
-      </p:sp>
-      <p:sp>
-        <p:nvSpPr>
-          <p:cNvPr id="3" name="Title 2"/>
-          <p:cNvSpPr>
-            <a:spLocks noGrp="1"/>
-          </p:cNvSpPr>
-          <p:nvPr>
-            <p:ph type="title"/>
-          </p:nvPr>
-        </p:nvSpPr>
-        <p:spPr/>
-        <p:txBody>
-          <a:bodyPr/>
-          <a:lstStyle/>
-          <a:p>
-            <a:r>
-              <a:rPr lang="en-GB" dirty="0" smtClean="0"/>
-              <a:t>Agenda</a:t>
-            </a:r>
-            <a:endParaRPr lang="en-GB" dirty="0"/>
-          </a:p>
-        </p:txBody>
-      </p:sp>
-    </p:spTree>
-    <p:extLst>
-      <p:ext uri="{BB962C8B-B14F-4D97-AF65-F5344CB8AC3E}">
-        <p14:creationId xmlns:p14="http://schemas.microsoft.com/office/powerpoint/2010/main" val="710695217"/>
-      </p:ext>
-    </p:extLst>
-  </p:cSld>
-  <p:clrMapOvr>
-    <a:masterClrMapping/>
-  </p:clrMapOvr>
-  <p:timing>
-    <p:tnLst>
-      <p:par>
-        <p:cTn id="1" dur="indefinite" restart="never" nodeType="tmRoot"/>
-      </p:par>
-    </p:tnLst>
-  </p:timing>
-</p:sld>
-</file>
-
-<file path=ppt/slides/slide3.xml><?xml version="1.0" encoding="utf-8"?>
-<p:sld xmlns:a="http://schemas.openxmlformats.org/drawingml/2006/main" xmlns:r="http://schemas.openxmlformats.org/officeDocument/2006/relationships" xmlns:p="http://schemas.openxmlformats.org/presentationml/2006/main">
-  <p:cSld>
-    <p:spTree>
-      <p:nvGrpSpPr>
-        <p:cNvPr id="1" name=""/>
-        <p:cNvGrpSpPr/>
-        <p:nvPr/>
-      </p:nvGrpSpPr>
-      <p:grpSpPr>
-        <a:xfrm>
-          <a:off x="0" y="0"/>
-          <a:ext cx="0" cy="0"/>
-          <a:chOff x="0" y="0"/>
-          <a:chExt cx="0" cy="0"/>
-        </a:xfrm>
-      </p:grpSpPr>
-      <p:sp>
-        <p:nvSpPr>
-          <p:cNvPr id="2" name="Content Placeholder 1"/>
-          <p:cNvSpPr>
-            <a:spLocks noGrp="1"/>
-          </p:cNvSpPr>
-          <p:nvPr>
-            <p:ph idx="1"/>
-          </p:nvPr>
-        </p:nvSpPr>
-        <p:spPr/>
-        <p:txBody>
-          <a:bodyPr/>
-          <a:lstStyle/>
-          <a:p>
             <a:pPr marL="0" indent="0">
               <a:spcBef>
                 <a:spcPts val="3000"/>
@@ -6078,7 +6421,7 @@
   <p:timing>
     <p:tnLst>
       <p:par>
-        <p:cTn id="1" dur="indefinite" restart="never" nodeType="tmRoot">
+        <p:cTn xmlns:p14="http://schemas.microsoft.com/office/powerpoint/2010/main" id="1" dur="indefinite" restart="never" nodeType="tmRoot">
           <p:childTnLst>
             <p:seq concurrent="1" nextAc="seek">
               <p:cTn id="2" dur="indefinite" nodeType="mainSeq">
@@ -6333,7 +6676,7 @@
 </p:sld>
 </file>
 
-<file path=ppt/slides/slide4.xml><?xml version="1.0" encoding="utf-8"?>
+<file path=ppt/slides/slide3.xml><?xml version="1.0" encoding="utf-8"?>
 <p:sld xmlns:a="http://schemas.openxmlformats.org/drawingml/2006/main" xmlns:r="http://schemas.openxmlformats.org/officeDocument/2006/relationships" xmlns:p="http://schemas.openxmlformats.org/presentationml/2006/main">
   <p:cSld>
     <p:spTree>
@@ -6522,7 +6865,7 @@
             </a:r>
           </a:p>
           <a:p>
-            <a:pPr marL="0" indent="0">
+            <a:pPr marL="0" indent="0" algn="ctr">
               <a:spcBef>
                 <a:spcPts val="18600"/>
               </a:spcBef>
@@ -6697,7 +7040,7 @@
   <p:timing>
     <p:tnLst>
       <p:par>
-        <p:cTn id="1" dur="indefinite" restart="never" nodeType="tmRoot">
+        <p:cTn xmlns:p14="http://schemas.microsoft.com/office/powerpoint/2010/main" id="1" dur="indefinite" restart="never" nodeType="tmRoot">
           <p:childTnLst>
             <p:seq concurrent="1" nextAc="seek">
               <p:cTn id="2" dur="indefinite" nodeType="mainSeq">
@@ -6967,7 +7310,7 @@
 </p:sld>
 </file>
 
-<file path=ppt/slides/slide5.xml><?xml version="1.0" encoding="utf-8"?>
+<file path=ppt/slides/slide4.xml><?xml version="1.0" encoding="utf-8"?>
 <p:sld xmlns:a="http://schemas.openxmlformats.org/drawingml/2006/main" xmlns:r="http://schemas.openxmlformats.org/officeDocument/2006/relationships" xmlns:p="http://schemas.openxmlformats.org/presentationml/2006/main">
   <p:cSld>
     <p:spTree>
@@ -7065,7 +7408,7 @@
   <p:timing>
     <p:tnLst>
       <p:par>
-        <p:cTn id="1" dur="indefinite" restart="never" nodeType="tmRoot">
+        <p:cTn xmlns:p14="http://schemas.microsoft.com/office/powerpoint/2010/main" id="1" dur="indefinite" restart="never" nodeType="tmRoot">
           <p:childTnLst>
             <p:seq concurrent="1" nextAc="seek">
               <p:cTn id="2" dur="indefinite" nodeType="mainSeq">
@@ -7162,7 +7505,7 @@
 </p:sld>
 </file>
 
-<file path=ppt/slides/slide6.xml><?xml version="1.0" encoding="utf-8"?>
+<file path=ppt/slides/slide5.xml><?xml version="1.0" encoding="utf-8"?>
 <p:sld xmlns:a="http://schemas.openxmlformats.org/drawingml/2006/main" xmlns:r="http://schemas.openxmlformats.org/officeDocument/2006/relationships" xmlns:p="http://schemas.openxmlformats.org/presentationml/2006/main">
   <p:cSld>
     <p:spTree>
@@ -7345,7 +7688,7 @@
   <p:timing>
     <p:tnLst>
       <p:par>
-        <p:cTn id="1" dur="indefinite" restart="never" nodeType="tmRoot">
+        <p:cTn xmlns:p14="http://schemas.microsoft.com/office/powerpoint/2010/main" id="1" dur="indefinite" restart="never" nodeType="tmRoot">
           <p:childTnLst>
             <p:seq concurrent="1" nextAc="seek">
               <p:cTn id="2" dur="indefinite" nodeType="mainSeq">
@@ -7599,7 +7942,7 @@
 </p:sld>
 </file>
 
-<file path=ppt/slides/slide7.xml><?xml version="1.0" encoding="utf-8"?>
+<file path=ppt/slides/slide6.xml><?xml version="1.0" encoding="utf-8"?>
 <p:sld xmlns:a="http://schemas.openxmlformats.org/drawingml/2006/main" xmlns:r="http://schemas.openxmlformats.org/officeDocument/2006/relationships" xmlns:p="http://schemas.openxmlformats.org/presentationml/2006/main">
   <p:cSld>
     <p:spTree>
@@ -7743,7 +8086,11 @@
             <a:pPr algn="r"/>
             <a:r>
               <a:rPr lang="en-US" sz="1400" dirty="0" smtClean="0"/>
-              <a:t>[2] The </a:t>
+              <a:t>[3] </a:t>
+            </a:r>
+            <a:r>
+              <a:rPr lang="en-US" sz="1400" dirty="0" smtClean="0"/>
+              <a:t>The </a:t>
             </a:r>
             <a:r>
               <a:rPr lang="en-US" sz="1400" dirty="0" err="1" smtClean="0"/>
@@ -7778,7 +8125,7 @@
   <p:timing>
     <p:tnLst>
       <p:par>
-        <p:cTn id="1" dur="indefinite" restart="never" nodeType="tmRoot">
+        <p:cTn xmlns:p14="http://schemas.microsoft.com/office/powerpoint/2010/main" id="1" dur="indefinite" restart="never" nodeType="tmRoot">
           <p:childTnLst>
             <p:seq concurrent="1" nextAc="seek">
               <p:cTn id="2" dur="indefinite" nodeType="mainSeq">
@@ -8058,7 +8405,7 @@
 </p:sld>
 </file>
 
-<file path=ppt/slides/slide8.xml><?xml version="1.0" encoding="utf-8"?>
+<file path=ppt/slides/slide7.xml><?xml version="1.0" encoding="utf-8"?>
 <p:sld xmlns:a="http://schemas.openxmlformats.org/drawingml/2006/main" xmlns:r="http://schemas.openxmlformats.org/officeDocument/2006/relationships" xmlns:p="http://schemas.openxmlformats.org/presentationml/2006/main">
   <p:cSld>
     <p:spTree>
@@ -8140,14 +8487,14 @@
   <p:timing>
     <p:tnLst>
       <p:par>
-        <p:cTn id="1" dur="indefinite" restart="never" nodeType="tmRoot"/>
+        <p:cTn xmlns:p14="http://schemas.microsoft.com/office/powerpoint/2010/main" id="1" dur="indefinite" restart="never" nodeType="tmRoot"/>
       </p:par>
     </p:tnLst>
   </p:timing>
 </p:sld>
 </file>
 
-<file path=ppt/slides/slide9.xml><?xml version="1.0" encoding="utf-8"?>
+<file path=ppt/slides/slide8.xml><?xml version="1.0" encoding="utf-8"?>
 <p:sld xmlns:a="http://schemas.openxmlformats.org/drawingml/2006/main" xmlns:r="http://schemas.openxmlformats.org/officeDocument/2006/relationships" xmlns:p="http://schemas.openxmlformats.org/presentationml/2006/main">
   <p:cSld>
     <p:spTree>
@@ -8191,7 +8538,56 @@
                 <a:spcPts val="2400"/>
               </a:spcBef>
             </a:pPr>
-            <a:endParaRPr lang="en-US" dirty="0"/>
+            <a:r>
+              <a:rPr lang="en-US" dirty="0" smtClean="0"/>
+              <a:t>Model that relies on response thresholds;</a:t>
+            </a:r>
+          </a:p>
+          <a:p>
+            <a:pPr>
+              <a:spcBef>
+                <a:spcPts val="2400"/>
+              </a:spcBef>
+            </a:pPr>
+            <a:r>
+              <a:rPr lang="en-US" dirty="0" smtClean="0"/>
+              <a:t>Every individual has a response threshold for every task;</a:t>
+            </a:r>
+          </a:p>
+          <a:p>
+            <a:pPr>
+              <a:spcBef>
+                <a:spcPts val="2400"/>
+              </a:spcBef>
+            </a:pPr>
+            <a:r>
+              <a:rPr lang="en-US" dirty="0" smtClean="0"/>
+              <a:t>Individuals engage in task performance when the level of the task-associated stimuli exceeds their thresholds.</a:t>
+            </a:r>
+          </a:p>
+          <a:p>
+            <a:pPr>
+              <a:spcBef>
+                <a:spcPts val="2400"/>
+              </a:spcBef>
+            </a:pPr>
+            <a:r>
+              <a:rPr lang="en-US" dirty="0" smtClean="0"/>
+              <a:t>Model proposed by </a:t>
+            </a:r>
+            <a:r>
+              <a:rPr lang="en-US" dirty="0" err="1" smtClean="0"/>
+              <a:t>Bonabeau</a:t>
+            </a:r>
+            <a:r>
+              <a:rPr lang="en-US" dirty="0" smtClean="0"/>
+              <a:t> at al. </a:t>
+            </a:r>
+            <a:r>
+              <a:rPr lang="en-US" baseline="30000" dirty="0" smtClean="0"/>
+              <a:t>[3]</a:t>
+            </a:r>
+            <a:endParaRPr lang="en-US" baseline="30000" dirty="0"/>
           </a:p>
         </p:txBody>
       </p:sp>
@@ -8215,6 +8611,57 @@
               <a:t>Task Allocation Model</a:t>
             </a:r>
             <a:endParaRPr lang="en-GB" dirty="0"/>
+          </a:p>
+        </p:txBody>
+      </p:sp>
+      <p:sp>
+        <p:nvSpPr>
+          <p:cNvPr id="4" name="TextBox 3"/>
+          <p:cNvSpPr txBox="1"/>
+          <p:nvPr/>
+        </p:nvSpPr>
+        <p:spPr>
+          <a:xfrm>
+            <a:off x="251520" y="5661248"/>
+            <a:ext cx="8677311" cy="523220"/>
+          </a:xfrm>
+          <a:prstGeom prst="rect">
+            <a:avLst/>
+          </a:prstGeom>
+          <a:noFill/>
+        </p:spPr>
+        <p:txBody>
+          <a:bodyPr wrap="square" rtlCol="0">
+            <a:spAutoFit/>
+          </a:bodyPr>
+          <a:lstStyle/>
+          <a:p>
+            <a:pPr algn="r"/>
+            <a:r>
+              <a:rPr lang="en-US" sz="1400" dirty="0" smtClean="0"/>
+              <a:t>[4] Quantitative study of the Fixed Threshold Model of the Regulation of Division of </a:t>
+            </a:r>
+            <a:r>
+              <a:rPr lang="en-US" sz="1400" dirty="0" err="1" smtClean="0"/>
+              <a:t>Labour</a:t>
+            </a:r>
+            <a:r>
+              <a:rPr lang="en-US" sz="1400" dirty="0" smtClean="0"/>
+              <a:t> in Insect Societies</a:t>
+            </a:r>
+            <a:r>
+              <a:rPr lang="en-US" sz="1400" dirty="0" smtClean="0"/>
+              <a:t>, </a:t>
+            </a:r>
+            <a:r>
+              <a:rPr lang="en-US" sz="1400" dirty="0" err="1" smtClean="0"/>
+              <a:t>Bernabeau</a:t>
+            </a:r>
+            <a:r>
+              <a:rPr lang="en-US" sz="1400" dirty="0" smtClean="0"/>
+              <a:t>, E. Proceedings Roy. Soc. London B 365 (1996): 1565-1569</a:t>
+            </a:r>
+            <a:endParaRPr lang="en-US" sz="1400" dirty="0"/>
           </a:p>
         </p:txBody>
       </p:sp>
@@ -8231,7 +8678,7 @@
   <p:timing>
     <p:tnLst>
       <p:par>
-        <p:cTn id="1" dur="indefinite" restart="never" nodeType="tmRoot">
+        <p:cTn xmlns:p14="http://schemas.microsoft.com/office/powerpoint/2010/main" id="1" dur="indefinite" restart="never" nodeType="tmRoot">
           <p:childTnLst>
             <p:seq concurrent="1" nextAc="seek">
               <p:cTn id="2" dur="indefinite" nodeType="mainSeq">
@@ -8252,15 +8699,10 @@
                             </p:stCondLst>
                             <p:childTnLst>
                               <p:par>
-                                <p:cTn id="5" presetID="10" presetClass="entr" presetSubtype="0" fill="hold" grpId="0" nodeType="afterEffect" nodePh="1">
+                                <p:cTn id="5" presetID="10" presetClass="entr" presetSubtype="0" fill="hold" grpId="0" nodeType="afterEffect">
                                   <p:stCondLst>
                                     <p:cond delay="0"/>
                                   </p:stCondLst>
-                                  <p:endCondLst>
-                                    <p:cond evt="begin" delay="0">
-                                      <p:tn val="5"/>
-                                    </p:cond>
-                                  </p:endCondLst>
                                   <p:childTnLst>
                                     <p:set>
                                       <p:cBhvr>
@@ -8305,6 +8747,189 @@
                       </p:childTnLst>
                     </p:cTn>
                   </p:par>
+                  <p:par>
+                    <p:cTn id="8" fill="hold">
+                      <p:stCondLst>
+                        <p:cond delay="indefinite"/>
+                      </p:stCondLst>
+                      <p:childTnLst>
+                        <p:par>
+                          <p:cTn id="9" fill="hold">
+                            <p:stCondLst>
+                              <p:cond delay="0"/>
+                            </p:stCondLst>
+                            <p:childTnLst>
+                              <p:par>
+                                <p:cTn id="10" presetID="10" presetClass="entr" presetSubtype="0" fill="hold" grpId="0" nodeType="clickEffect">
+                                  <p:stCondLst>
+                                    <p:cond delay="0"/>
+                                  </p:stCondLst>
+                                  <p:childTnLst>
+                                    <p:set>
+                                      <p:cBhvr>
+                                        <p:cTn id="11" dur="1" fill="hold">
+                                          <p:stCondLst>
+                                            <p:cond delay="0"/>
+                                          </p:stCondLst>
+                                        </p:cTn>
+                                        <p:tgtEl>
+                                          <p:spTgt spid="2">
+                                            <p:txEl>
+                                              <p:pRg st="1" end="1"/>
+                                            </p:txEl>
+                                          </p:spTgt>
+                                        </p:tgtEl>
+                                        <p:attrNameLst>
+                                          <p:attrName>style.visibility</p:attrName>
+                                        </p:attrNameLst>
+                                      </p:cBhvr>
+                                      <p:to>
+                                        <p:strVal val="visible"/>
+                                      </p:to>
+                                    </p:set>
+                                    <p:animEffect transition="in" filter="fade">
+                                      <p:cBhvr>
+                                        <p:cTn id="12" dur="500"/>
+                                        <p:tgtEl>
+                                          <p:spTgt spid="2">
+                                            <p:txEl>
+                                              <p:pRg st="1" end="1"/>
+                                            </p:txEl>
+                                          </p:spTgt>
+                                        </p:tgtEl>
+                                      </p:cBhvr>
+                                    </p:animEffect>
+                                  </p:childTnLst>
+                                </p:cTn>
+                              </p:par>
+                            </p:childTnLst>
+                          </p:cTn>
+                        </p:par>
+                      </p:childTnLst>
+                    </p:cTn>
+                  </p:par>
+                  <p:par>
+                    <p:cTn id="13" fill="hold">
+                      <p:stCondLst>
+                        <p:cond delay="indefinite"/>
+                      </p:stCondLst>
+                      <p:childTnLst>
+                        <p:par>
+                          <p:cTn id="14" fill="hold">
+                            <p:stCondLst>
+                              <p:cond delay="0"/>
+                            </p:stCondLst>
+                            <p:childTnLst>
+                              <p:par>
+                                <p:cTn id="15" presetID="10" presetClass="entr" presetSubtype="0" fill="hold" grpId="0" nodeType="clickEffect">
+                                  <p:stCondLst>
+                                    <p:cond delay="0"/>
+                                  </p:stCondLst>
+                                  <p:childTnLst>
+                                    <p:set>
+                                      <p:cBhvr>
+                                        <p:cTn id="16" dur="1" fill="hold">
+                                          <p:stCondLst>
+                                            <p:cond delay="0"/>
+                                          </p:stCondLst>
+                                        </p:cTn>
+                                        <p:tgtEl>
+                                          <p:spTgt spid="2">
+                                            <p:txEl>
+                                              <p:pRg st="2" end="2"/>
+                                            </p:txEl>
+                                          </p:spTgt>
+                                        </p:tgtEl>
+                                        <p:attrNameLst>
+                                          <p:attrName>style.visibility</p:attrName>
+                                        </p:attrNameLst>
+                                      </p:cBhvr>
+                                      <p:to>
+                                        <p:strVal val="visible"/>
+                                      </p:to>
+                                    </p:set>
+                                    <p:animEffect transition="in" filter="fade">
+                                      <p:cBhvr>
+                                        <p:cTn id="17" dur="500"/>
+                                        <p:tgtEl>
+                                          <p:spTgt spid="2">
+                                            <p:txEl>
+                                              <p:pRg st="2" end="2"/>
+                                            </p:txEl>
+                                          </p:spTgt>
+                                        </p:tgtEl>
+                                      </p:cBhvr>
+                                    </p:animEffect>
+                                  </p:childTnLst>
+                                </p:cTn>
+                              </p:par>
+                            </p:childTnLst>
+                          </p:cTn>
+                        </p:par>
+                      </p:childTnLst>
+                    </p:cTn>
+                  </p:par>
+                  <p:par>
+                    <p:cTn id="18" fill="hold">
+                      <p:stCondLst>
+                        <p:cond delay="indefinite"/>
+                      </p:stCondLst>
+                      <p:childTnLst>
+                        <p:par>
+                          <p:cTn id="19" fill="hold">
+                            <p:stCondLst>
+                              <p:cond delay="0"/>
+                            </p:stCondLst>
+                            <p:childTnLst>
+                              <p:par>
+                                <p:cTn id="20" presetID="10" presetClass="entr" presetSubtype="0" fill="hold" grpId="0" nodeType="clickEffect">
+                                  <p:stCondLst>
+                                    <p:cond delay="0"/>
+                                  </p:stCondLst>
+                                  <p:childTnLst>
+                                    <p:set>
+                                      <p:cBhvr>
+                                        <p:cTn id="21" dur="1" fill="hold">
+                                          <p:stCondLst>
+                                            <p:cond delay="0"/>
+                                          </p:stCondLst>
+                                        </p:cTn>
+                                        <p:tgtEl>
+                                          <p:spTgt spid="2">
+                                            <p:txEl>
+                                              <p:pRg st="3" end="3"/>
+                                            </p:txEl>
+                                          </p:spTgt>
+                                        </p:tgtEl>
+                                        <p:attrNameLst>
+                                          <p:attrName>style.visibility</p:attrName>
+                                        </p:attrNameLst>
+                                      </p:cBhvr>
+                                      <p:to>
+                                        <p:strVal val="visible"/>
+                                      </p:to>
+                                    </p:set>
+                                    <p:animEffect transition="in" filter="fade">
+                                      <p:cBhvr>
+                                        <p:cTn id="22" dur="500"/>
+                                        <p:tgtEl>
+                                          <p:spTgt spid="2">
+                                            <p:txEl>
+                                              <p:pRg st="3" end="3"/>
+                                            </p:txEl>
+                                          </p:spTgt>
+                                        </p:tgtEl>
+                                      </p:cBhvr>
+                                    </p:animEffect>
+                                  </p:childTnLst>
+                                </p:cTn>
+                              </p:par>
+                            </p:childTnLst>
+                          </p:cTn>
+                        </p:par>
+                      </p:childTnLst>
+                    </p:cTn>
+                  </p:par>
                 </p:childTnLst>
               </p:cTn>
               <p:prevCondLst>
@@ -8329,6 +8954,188 @@
     <p:bldLst>
       <p:bldP spid="2" grpId="0" build="p"/>
     </p:bldLst>
+  </p:timing>
+</p:sld>
+</file>
+
+<file path=ppt/slides/slide9.xml><?xml version="1.0" encoding="utf-8"?>
+<p:sld xmlns:a="http://schemas.openxmlformats.org/drawingml/2006/main" xmlns:r="http://schemas.openxmlformats.org/officeDocument/2006/relationships" xmlns:p="http://schemas.openxmlformats.org/presentationml/2006/main">
+  <p:cSld>
+    <p:spTree>
+      <p:nvGrpSpPr>
+        <p:cNvPr id="1" name=""/>
+        <p:cNvGrpSpPr/>
+        <p:nvPr/>
+      </p:nvGrpSpPr>
+      <p:grpSpPr>
+        <a:xfrm>
+          <a:off x="0" y="0"/>
+          <a:ext cx="0" cy="0"/>
+          <a:chOff x="0" y="0"/>
+          <a:chExt cx="0" cy="0"/>
+        </a:xfrm>
+      </p:grpSpPr>
+      <p:sp>
+        <p:nvSpPr>
+          <p:cNvPr id="3" name="Title 2"/>
+          <p:cNvSpPr>
+            <a:spLocks noGrp="1"/>
+          </p:cNvSpPr>
+          <p:nvPr>
+            <p:ph type="title"/>
+          </p:nvPr>
+        </p:nvSpPr>
+        <p:spPr/>
+        <p:txBody>
+          <a:bodyPr/>
+          <a:lstStyle/>
+          <a:p>
+            <a:r>
+              <a:rPr lang="en-GB" dirty="0" smtClean="0"/>
+              <a:t>Task Allocation Model</a:t>
+            </a:r>
+            <a:endParaRPr lang="en-GB" dirty="0"/>
+          </a:p>
+        </p:txBody>
+      </p:sp>
+      <p:graphicFrame>
+        <p:nvGraphicFramePr>
+          <p:cNvPr id="5" name="Content Placeholder 4"/>
+          <p:cNvGraphicFramePr>
+            <a:graphicFrameLocks noGrp="1" noChangeAspect="1"/>
+          </p:cNvGraphicFramePr>
+          <p:nvPr>
+            <p:ph idx="1"/>
+            <p:extLst>
+              <p:ext uri="{D42A27DB-BD31-4B8C-83A1-F6EECF244321}">
+                <p14:modId xmlns:p14="http://schemas.microsoft.com/office/powerpoint/2010/main" val="2832184963"/>
+              </p:ext>
+            </p:extLst>
+          </p:nvPr>
+        </p:nvGraphicFramePr>
+        <p:xfrm>
+          <a:off x="2843808" y="1214512"/>
+          <a:ext cx="3198813" cy="1422400"/>
+        </p:xfrm>
+        <a:graphic>
+          <a:graphicData uri="http://schemas.openxmlformats.org/presentationml/2006/ole">
+            <mc:AlternateContent xmlns:mc="http://schemas.openxmlformats.org/markup-compatibility/2006">
+              <mc:Choice xmlns:v="urn:schemas-microsoft-com:vml" Requires="v">
+                <p:oleObj spid="_x0000_s1034" name="Equation" r:id="rId4" imgW="914400" imgH="406400" progId="Equation.3">
+                  <p:embed/>
+                </p:oleObj>
+              </mc:Choice>
+              <mc:Fallback>
+                <p:oleObj name="Equation" r:id="rId4" imgW="914400" imgH="406400" progId="Equation.3">
+                  <p:embed/>
+                  <p:pic>
+                    <p:nvPicPr>
+                      <p:cNvPr id="0" name=""/>
+                      <p:cNvPicPr/>
+                      <p:nvPr/>
+                    </p:nvPicPr>
+                    <p:blipFill>
+                      <a:blip r:embed="rId5"/>
+                      <a:stretch>
+                        <a:fillRect/>
+                      </a:stretch>
+                    </p:blipFill>
+                    <p:spPr>
+                      <a:xfrm>
+                        <a:off x="2843808" y="1214512"/>
+                        <a:ext cx="3198813" cy="1422400"/>
+                      </a:xfrm>
+                      <a:prstGeom prst="rect">
+                        <a:avLst/>
+                      </a:prstGeom>
+                    </p:spPr>
+                  </p:pic>
+                </p:oleObj>
+              </mc:Fallback>
+            </mc:AlternateContent>
+          </a:graphicData>
+        </a:graphic>
+      </p:graphicFrame>
+      <p:pic>
+        <p:nvPicPr>
+          <p:cNvPr id="6" name="Picture 5" descr="Screen Shot 2012-06-06 at 00.48.03.png"/>
+          <p:cNvPicPr>
+            <a:picLocks noChangeAspect="1"/>
+          </p:cNvPicPr>
+          <p:nvPr/>
+        </p:nvPicPr>
+        <p:blipFill>
+          <a:blip r:embed="rId6">
+            <a:extLst>
+              <a:ext uri="{28A0092B-C50C-407E-A947-70E740481C1C}">
+                <a14:useLocalDpi xmlns:a14="http://schemas.microsoft.com/office/drawing/2010/main" val="0"/>
+              </a:ext>
+            </a:extLst>
+          </a:blip>
+          <a:stretch>
+            <a:fillRect/>
+          </a:stretch>
+        </p:blipFill>
+        <p:spPr>
+          <a:xfrm>
+            <a:off x="467544" y="2930376"/>
+            <a:ext cx="3901882" cy="2802880"/>
+          </a:xfrm>
+          <a:prstGeom prst="roundRect">
+            <a:avLst>
+              <a:gd name="adj" fmla="val 13938"/>
+            </a:avLst>
+          </a:prstGeom>
+        </p:spPr>
+      </p:pic>
+      <p:pic>
+        <p:nvPicPr>
+          <p:cNvPr id="7" name="Picture 6" descr="Screen Shot 2012-06-06 at 00.48.14.png"/>
+          <p:cNvPicPr>
+            <a:picLocks noChangeAspect="1"/>
+          </p:cNvPicPr>
+          <p:nvPr/>
+        </p:nvPicPr>
+        <p:blipFill>
+          <a:blip r:embed="rId7">
+            <a:extLst>
+              <a:ext uri="{28A0092B-C50C-407E-A947-70E740481C1C}">
+                <a14:useLocalDpi xmlns:a14="http://schemas.microsoft.com/office/drawing/2010/main" val="0"/>
+              </a:ext>
+            </a:extLst>
+          </a:blip>
+          <a:stretch>
+            <a:fillRect/>
+          </a:stretch>
+        </p:blipFill>
+        <p:spPr>
+          <a:xfrm>
+            <a:off x="4788024" y="2996952"/>
+            <a:ext cx="3822529" cy="2726680"/>
+          </a:xfrm>
+          <a:prstGeom prst="roundRect">
+            <a:avLst>
+              <a:gd name="adj" fmla="val 10495"/>
+            </a:avLst>
+          </a:prstGeom>
+        </p:spPr>
+      </p:pic>
+    </p:spTree>
+    <p:extLst>
+      <p:ext uri="{BB962C8B-B14F-4D97-AF65-F5344CB8AC3E}">
+        <p14:creationId xmlns:p14="http://schemas.microsoft.com/office/powerpoint/2010/main" val="2710394958"/>
+      </p:ext>
+    </p:extLst>
+  </p:cSld>
+  <p:clrMapOvr>
+    <a:masterClrMapping/>
+  </p:clrMapOvr>
+  <p:timing>
+    <p:tnLst>
+      <p:par>
+        <p:cTn xmlns:p14="http://schemas.microsoft.com/office/powerpoint/2010/main" id="1" dur="indefinite" restart="never" nodeType="tmRoot"/>
+      </p:par>
+    </p:tnLst>
   </p:timing>
 </p:sld>
 </file>

</xml_diff>

<commit_message>
Render class created. UML class diagram compacted to appear better on screen.
</commit_message>
<xml_diff>
--- a/presentation-june/Presentation.pptx
+++ b/presentation-june/Presentation.pptx
@@ -5,7 +5,7 @@
     <p:sldMasterId id="2147483648" r:id="rId1"/>
   </p:sldMasterIdLst>
   <p:notesMasterIdLst>
-    <p:notesMasterId r:id="rId16"/>
+    <p:notesMasterId r:id="rId15"/>
   </p:notesMasterIdLst>
   <p:sldIdLst>
     <p:sldId id="256" r:id="rId2"/>
@@ -21,7 +21,6 @@
     <p:sldId id="265" r:id="rId12"/>
     <p:sldId id="266" r:id="rId13"/>
     <p:sldId id="272" r:id="rId14"/>
-    <p:sldId id="268" r:id="rId15"/>
   </p:sldIdLst>
   <p:sldSz cx="9144000" cy="6858000" type="screen4x3"/>
   <p:notesSz cx="6858000" cy="9144000"/>
@@ -126,7 +125,7 @@
 <file path=ppt/charts/chart1.xml><?xml version="1.0" encoding="utf-8"?>
 <c:chartSpace xmlns:c="http://schemas.openxmlformats.org/drawingml/2006/chart" xmlns:a="http://schemas.openxmlformats.org/drawingml/2006/main" xmlns:r="http://schemas.openxmlformats.org/officeDocument/2006/relationships">
   <c:date1904 val="0"/>
-  <c:lang val="en-US"/>
+  <c:lang val="en-GB"/>
   <c:roundedCorners val="0"/>
   <mc:AlternateContent xmlns:mc="http://schemas.openxmlformats.org/markup-compatibility/2006">
     <mc:Choice xmlns:c14="http://schemas.microsoft.com/office/drawing/2007/8/2/chart" Requires="c14">
@@ -292,10 +291,10 @@
                 <c:formatCode>General</c:formatCode>
                 <c:ptCount val="2"/>
                 <c:pt idx="0">
-                  <c:v>2.0</c:v>
+                  <c:v>2</c:v>
                 </c:pt>
                 <c:pt idx="1">
-                  <c:v>98.0</c:v>
+                  <c:v>98</c:v>
                 </c:pt>
               </c:numCache>
             </c:numRef>
@@ -335,7 +334,7 @@
 <file path=ppt/charts/chart2.xml><?xml version="1.0" encoding="utf-8"?>
 <c:chartSpace xmlns:c="http://schemas.openxmlformats.org/drawingml/2006/chart" xmlns:a="http://schemas.openxmlformats.org/drawingml/2006/main" xmlns:r="http://schemas.openxmlformats.org/officeDocument/2006/relationships">
   <c:date1904 val="0"/>
-  <c:lang val="en-US"/>
+  <c:lang val="en-GB"/>
   <c:roundedCorners val="0"/>
   <mc:AlternateContent xmlns:mc="http://schemas.openxmlformats.org/markup-compatibility/2006">
     <mc:Choice xmlns:c14="http://schemas.microsoft.com/office/drawing/2007/8/2/chart" Requires="c14">
@@ -501,10 +500,10 @@
                 <c:formatCode>General</c:formatCode>
                 <c:ptCount val="2"/>
                 <c:pt idx="0">
-                  <c:v>50.0</c:v>
+                  <c:v>50</c:v>
                 </c:pt>
                 <c:pt idx="1">
-                  <c:v>50.0</c:v>
+                  <c:v>50</c:v>
                 </c:pt>
               </c:numCache>
             </c:numRef>
@@ -633,7 +632,7 @@
           <a:p>
             <a:fld id="{D2D90C8E-9ABA-428A-AE3B-7180319A3F53}" type="datetimeFigureOut">
               <a:rPr lang="en-GB" smtClean="0"/>
-              <a:t>06/06/2012</a:t>
+              <a:t>07/06/2012</a:t>
             </a:fld>
             <a:endParaRPr lang="en-GB"/>
           </a:p>
@@ -1708,7 +1707,7 @@
           <a:p>
             <a:fld id="{70186140-57E4-4B6F-BB49-D5C1E28E250A}" type="datetimeFigureOut">
               <a:rPr lang="en-GB" smtClean="0"/>
-              <a:t>06/06/2012</a:t>
+              <a:t>07/06/2012</a:t>
             </a:fld>
             <a:endParaRPr lang="en-GB"/>
           </a:p>
@@ -1769,7 +1768,7 @@
   <p:timing>
     <p:tnLst>
       <p:par>
-        <p:cTn xmlns:p14="http://schemas.microsoft.com/office/powerpoint/2010/main" id="1" dur="indefinite" restart="never" nodeType="tmRoot"/>
+        <p:cTn id="1" dur="indefinite" restart="never" nodeType="tmRoot"/>
       </p:par>
     </p:tnLst>
   </p:timing>
@@ -1885,7 +1884,7 @@
           <a:p>
             <a:fld id="{70186140-57E4-4B6F-BB49-D5C1E28E250A}" type="datetimeFigureOut">
               <a:rPr lang="en-GB" smtClean="0"/>
-              <a:t>06/06/2012</a:t>
+              <a:t>07/06/2012</a:t>
             </a:fld>
             <a:endParaRPr lang="en-GB"/>
           </a:p>
@@ -2065,7 +2064,7 @@
           <a:p>
             <a:fld id="{70186140-57E4-4B6F-BB49-D5C1E28E250A}" type="datetimeFigureOut">
               <a:rPr lang="en-GB" smtClean="0"/>
-              <a:t>06/06/2012</a:t>
+              <a:t>07/06/2012</a:t>
             </a:fld>
             <a:endParaRPr lang="en-GB"/>
           </a:p>
@@ -2247,7 +2246,7 @@
           <a:p>
             <a:fld id="{70186140-57E4-4B6F-BB49-D5C1E28E250A}" type="datetimeFigureOut">
               <a:rPr lang="en-GB" smtClean="0"/>
-              <a:t>06/06/2012</a:t>
+              <a:t>07/06/2012</a:t>
             </a:fld>
             <a:endParaRPr lang="en-GB"/>
           </a:p>
@@ -2354,7 +2353,7 @@
   <p:timing>
     <p:tnLst>
       <p:par>
-        <p:cTn xmlns:p14="http://schemas.microsoft.com/office/powerpoint/2010/main" id="1" dur="indefinite" restart="never" nodeType="tmRoot"/>
+        <p:cTn id="1" dur="indefinite" restart="never" nodeType="tmRoot"/>
       </p:par>
     </p:tnLst>
   </p:timing>
@@ -2546,7 +2545,7 @@
           <a:p>
             <a:fld id="{70186140-57E4-4B6F-BB49-D5C1E28E250A}" type="datetimeFigureOut">
               <a:rPr lang="en-GB" smtClean="0"/>
-              <a:t>06/06/2012</a:t>
+              <a:t>07/06/2012</a:t>
             </a:fld>
             <a:endParaRPr lang="en-GB"/>
           </a:p>
@@ -2834,7 +2833,7 @@
           <a:p>
             <a:fld id="{70186140-57E4-4B6F-BB49-D5C1E28E250A}" type="datetimeFigureOut">
               <a:rPr lang="en-GB" smtClean="0"/>
-              <a:t>06/06/2012</a:t>
+              <a:t>07/06/2012</a:t>
             </a:fld>
             <a:endParaRPr lang="en-GB"/>
           </a:p>
@@ -3256,7 +3255,7 @@
           <a:p>
             <a:fld id="{70186140-57E4-4B6F-BB49-D5C1E28E250A}" type="datetimeFigureOut">
               <a:rPr lang="en-GB" smtClean="0"/>
-              <a:t>06/06/2012</a:t>
+              <a:t>07/06/2012</a:t>
             </a:fld>
             <a:endParaRPr lang="en-GB"/>
           </a:p>
@@ -3374,7 +3373,7 @@
           <a:p>
             <a:fld id="{70186140-57E4-4B6F-BB49-D5C1E28E250A}" type="datetimeFigureOut">
               <a:rPr lang="en-GB" smtClean="0"/>
-              <a:t>06/06/2012</a:t>
+              <a:t>07/06/2012</a:t>
             </a:fld>
             <a:endParaRPr lang="en-GB"/>
           </a:p>
@@ -3469,7 +3468,7 @@
           <a:p>
             <a:fld id="{70186140-57E4-4B6F-BB49-D5C1E28E250A}" type="datetimeFigureOut">
               <a:rPr lang="en-GB" smtClean="0"/>
-              <a:t>06/06/2012</a:t>
+              <a:t>07/06/2012</a:t>
             </a:fld>
             <a:endParaRPr lang="en-GB"/>
           </a:p>
@@ -3746,7 +3745,7 @@
           <a:p>
             <a:fld id="{70186140-57E4-4B6F-BB49-D5C1E28E250A}" type="datetimeFigureOut">
               <a:rPr lang="en-GB" smtClean="0"/>
-              <a:t>06/06/2012</a:t>
+              <a:t>07/06/2012</a:t>
             </a:fld>
             <a:endParaRPr lang="en-GB"/>
           </a:p>
@@ -3999,7 +3998,7 @@
           <a:p>
             <a:fld id="{70186140-57E4-4B6F-BB49-D5C1E28E250A}" type="datetimeFigureOut">
               <a:rPr lang="en-GB" smtClean="0"/>
-              <a:t>06/06/2012</a:t>
+              <a:t>07/06/2012</a:t>
             </a:fld>
             <a:endParaRPr lang="en-GB"/>
           </a:p>
@@ -4212,7 +4211,7 @@
           <a:p>
             <a:fld id="{70186140-57E4-4B6F-BB49-D5C1E28E250A}" type="datetimeFigureOut">
               <a:rPr lang="en-GB" smtClean="0"/>
-              <a:t>06/06/2012</a:t>
+              <a:t>07/06/2012</a:t>
             </a:fld>
             <a:endParaRPr lang="en-GB"/>
           </a:p>
@@ -4320,7 +4319,7 @@
   <p:timing>
     <p:tnLst>
       <p:par>
-        <p:cTn xmlns:p14="http://schemas.microsoft.com/office/powerpoint/2010/main" id="1" dur="indefinite" restart="never" nodeType="tmRoot"/>
+        <p:cTn id="1" dur="indefinite" restart="never" nodeType="tmRoot"/>
       </p:par>
     </p:tnLst>
   </p:timing>
@@ -4736,14 +4735,14 @@
           </a:ln>
           <a:effectLst/>
           <a:extLst>
-            <a:ext uri="{909E8E84-426E-40dd-AFC4-6F175D3DCCD1}">
+            <a:ext uri="{909E8E84-426E-40DD-AFC4-6F175D3DCCD1}">
               <a14:hiddenFill xmlns:a14="http://schemas.microsoft.com/office/drawing/2010/main">
                 <a:solidFill>
                   <a:schemeClr val="accent1"/>
                 </a:solidFill>
               </a14:hiddenFill>
             </a:ext>
-            <a:ext uri="{91240B29-F687-4f45-9708-019B960494DF}">
+            <a:ext uri="{91240B29-F687-4F45-9708-019B960494DF}">
               <a14:hiddenLine xmlns:a14="http://schemas.microsoft.com/office/drawing/2010/main" w="9525">
                 <a:solidFill>
                   <a:schemeClr val="tx1"/>
@@ -4753,7 +4752,7 @@
                 <a:tailEnd/>
               </a14:hiddenLine>
             </a:ext>
-            <a:ext uri="{AF507438-7753-43e0-B8FC-AC1667EBCBE1}">
+            <a:ext uri="{AF507438-7753-43E0-B8FC-AC1667EBCBE1}">
               <a14:hiddenEffects xmlns:a14="http://schemas.microsoft.com/office/drawing/2010/main">
                 <a:effectLst>
                   <a:outerShdw dist="35921" dir="2700000" algn="ctr" rotWithShape="0">
@@ -4942,7 +4941,7 @@
   <p:timing>
     <p:tnLst>
       <p:par>
-        <p:cTn xmlns:p14="http://schemas.microsoft.com/office/powerpoint/2010/main" id="1" dur="indefinite" restart="never" nodeType="tmRoot"/>
+        <p:cTn id="1" dur="indefinite" restart="never" nodeType="tmRoot"/>
       </p:par>
     </p:tnLst>
   </p:timing>
@@ -5057,7 +5056,7 @@
   <p:timing>
     <p:tnLst>
       <p:par>
-        <p:cTn xmlns:p14="http://schemas.microsoft.com/office/powerpoint/2010/main" id="1" dur="indefinite" restart="never" nodeType="tmRoot">
+        <p:cTn id="1" dur="indefinite" restart="never" nodeType="tmRoot">
           <p:childTnLst>
             <p:seq concurrent="1" nextAc="seek">
               <p:cTn id="2" dur="indefinite" nodeType="mainSeq">
@@ -5349,7 +5348,7 @@
   <p:timing>
     <p:tnLst>
       <p:par>
-        <p:cTn xmlns:p14="http://schemas.microsoft.com/office/powerpoint/2010/main" id="1" dur="indefinite" restart="never" nodeType="tmRoot">
+        <p:cTn id="1" dur="indefinite" restart="never" nodeType="tmRoot">
           <p:childTnLst>
             <p:seq concurrent="1" nextAc="seek">
               <p:cTn id="2" dur="indefinite" nodeType="mainSeq">
@@ -5697,17 +5696,12 @@
             </a:pPr>
             <a:r>
               <a:rPr lang="en-GB" dirty="0" smtClean="0"/>
-              <a:t>Pheromone trail updates need to be </a:t>
-            </a:r>
-            <a:r>
-              <a:rPr lang="en-GB" dirty="0" smtClean="0"/>
-              <a:t>local</a:t>
+              <a:t>Pheromone trail updates need to be local</a:t>
             </a:r>
             <a:r>
               <a:rPr lang="en-GB" dirty="0"/>
               <a:t>;</a:t>
             </a:r>
-            <a:endParaRPr lang="en-GB" dirty="0"/>
           </a:p>
           <a:p>
             <a:pPr>
@@ -5736,7 +5730,7 @@
   <p:timing>
     <p:tnLst>
       <p:par>
-        <p:cTn xmlns:p14="http://schemas.microsoft.com/office/powerpoint/2010/main" id="1" dur="indefinite" restart="never" nodeType="tmRoot">
+        <p:cTn id="1" dur="indefinite" restart="never" nodeType="tmRoot">
           <p:childTnLst>
             <p:seq concurrent="1" nextAc="seek">
               <p:cTn id="2" dur="indefinite" nodeType="mainSeq">
@@ -6926,192 +6920,7 @@
   <p:timing>
     <p:tnLst>
       <p:par>
-        <p:cTn xmlns:p14="http://schemas.microsoft.com/office/powerpoint/2010/main" id="1" dur="indefinite" restart="never" nodeType="tmRoot"/>
-      </p:par>
-    </p:tnLst>
-  </p:timing>
-</p:sld>
-</file>
-
-<file path=ppt/slides/slide14.xml><?xml version="1.0" encoding="utf-8"?>
-<p:sld xmlns:a="http://schemas.openxmlformats.org/drawingml/2006/main" xmlns:r="http://schemas.openxmlformats.org/officeDocument/2006/relationships" xmlns:p="http://schemas.openxmlformats.org/presentationml/2006/main">
-  <p:cSld>
-    <p:spTree>
-      <p:nvGrpSpPr>
-        <p:cNvPr id="1" name=""/>
-        <p:cNvGrpSpPr/>
-        <p:nvPr/>
-      </p:nvGrpSpPr>
-      <p:grpSpPr>
-        <a:xfrm>
-          <a:off x="0" y="0"/>
-          <a:ext cx="0" cy="0"/>
-          <a:chOff x="0" y="0"/>
-          <a:chExt cx="0" cy="0"/>
-        </a:xfrm>
-      </p:grpSpPr>
-      <p:grpSp>
-        <p:nvGrpSpPr>
-          <p:cNvPr id="7" name="Group 6"/>
-          <p:cNvGrpSpPr/>
-          <p:nvPr/>
-        </p:nvGrpSpPr>
-        <p:grpSpPr>
-          <a:xfrm>
-            <a:off x="3059832" y="1289018"/>
-            <a:ext cx="2493996" cy="3148409"/>
-            <a:chOff x="3540125" y="1355899"/>
-            <a:chExt cx="2493996" cy="3148409"/>
-          </a:xfrm>
-        </p:grpSpPr>
-        <p:pic>
-          <p:nvPicPr>
-            <p:cNvPr id="1027" name="Picture 3" descr="C:\Users\luiza\Desktop\presentation\stock\australis2.jpg"/>
-            <p:cNvPicPr>
-              <a:picLocks noChangeAspect="1" noChangeArrowheads="1"/>
-            </p:cNvPicPr>
-            <p:nvPr/>
-          </p:nvPicPr>
-          <p:blipFill>
-            <a:blip r:embed="rId2">
-              <a:extLst>
-                <a:ext uri="{BEBA8EAE-BF5A-486C-A8C5-ECC9F3942E4B}">
-                  <a14:imgProps xmlns:a14="http://schemas.microsoft.com/office/drawing/2010/main">
-                    <a14:imgLayer r:embed="rId3">
-                      <a14:imgEffect>
-                        <a14:backgroundRemoval t="16413" b="89970" l="15000" r="95000"/>
-                      </a14:imgEffect>
-                    </a14:imgLayer>
-                  </a14:imgProps>
-                </a:ext>
-                <a:ext uri="{28A0092B-C50C-407E-A947-70E740481C1C}">
-                  <a14:useLocalDpi xmlns:a14="http://schemas.microsoft.com/office/drawing/2010/main" val="0"/>
-                </a:ext>
-              </a:extLst>
-            </a:blip>
-            <a:srcRect/>
-            <a:stretch>
-              <a:fillRect/>
-            </a:stretch>
-          </p:blipFill>
-          <p:spPr bwMode="auto">
-            <a:xfrm rot="21369794">
-              <a:off x="3540125" y="2924944"/>
-              <a:ext cx="2493996" cy="1579364"/>
-            </a:xfrm>
-            <a:prstGeom prst="rect">
-              <a:avLst/>
-            </a:prstGeom>
-            <a:noFill/>
-            <a:ln>
-              <a:noFill/>
-            </a:ln>
-            <a:extLst>
-              <a:ext uri="{909E8E84-426E-40dd-AFC4-6F175D3DCCD1}">
-                <a14:hiddenFill xmlns:a14="http://schemas.microsoft.com/office/drawing/2010/main">
-                  <a:solidFill>
-                    <a:srgbClr val="FFFFFF"/>
-                  </a:solidFill>
-                </a14:hiddenFill>
-              </a:ext>
-            </a:extLst>
-          </p:spPr>
-        </p:pic>
-        <p:sp>
-          <p:nvSpPr>
-            <p:cNvPr id="6" name="TextBox 5"/>
-            <p:cNvSpPr txBox="1"/>
-            <p:nvPr/>
-          </p:nvSpPr>
-          <p:spPr>
-            <a:xfrm rot="900000">
-              <a:off x="4529858" y="1355899"/>
-              <a:ext cx="1004715" cy="2215991"/>
-            </a:xfrm>
-            <a:prstGeom prst="rect">
-              <a:avLst/>
-            </a:prstGeom>
-            <a:noFill/>
-          </p:spPr>
-          <p:txBody>
-            <a:bodyPr wrap="none" rtlCol="0">
-              <a:spAutoFit/>
-            </a:bodyPr>
-            <a:lstStyle/>
-            <a:p>
-              <a:r>
-                <a:rPr lang="en-GB" sz="13800" dirty="0" smtClean="0">
-                  <a:solidFill>
-                    <a:srgbClr val="77933C"/>
-                  </a:solidFill>
-                </a:rPr>
-                <a:t>?</a:t>
-              </a:r>
-              <a:endParaRPr lang="en-GB" sz="13800" dirty="0">
-                <a:solidFill>
-                  <a:srgbClr val="77933C"/>
-                </a:solidFill>
-              </a:endParaRPr>
-            </a:p>
-          </p:txBody>
-        </p:sp>
-        <p:sp>
-          <p:nvSpPr>
-            <p:cNvPr id="9" name="TextBox 8"/>
-            <p:cNvSpPr txBox="1"/>
-            <p:nvPr/>
-          </p:nvSpPr>
-          <p:spPr>
-            <a:xfrm rot="19800000">
-              <a:off x="3900111" y="2068751"/>
-              <a:ext cx="707245" cy="1446550"/>
-            </a:xfrm>
-            <a:prstGeom prst="rect">
-              <a:avLst/>
-            </a:prstGeom>
-            <a:noFill/>
-          </p:spPr>
-          <p:txBody>
-            <a:bodyPr wrap="none" rtlCol="0">
-              <a:spAutoFit/>
-            </a:bodyPr>
-            <a:lstStyle/>
-            <a:p>
-              <a:r>
-                <a:rPr lang="en-GB" sz="8800" dirty="0" smtClean="0">
-                  <a:solidFill>
-                    <a:schemeClr val="accent3">
-                      <a:lumMod val="75000"/>
-                    </a:schemeClr>
-                  </a:solidFill>
-                </a:rPr>
-                <a:t>?</a:t>
-              </a:r>
-              <a:endParaRPr lang="en-GB" sz="8800" dirty="0">
-                <a:solidFill>
-                  <a:schemeClr val="accent3">
-                    <a:lumMod val="75000"/>
-                  </a:schemeClr>
-                </a:solidFill>
-              </a:endParaRPr>
-            </a:p>
-          </p:txBody>
-        </p:sp>
-      </p:grpSp>
-    </p:spTree>
-    <p:extLst>
-      <p:ext uri="{BB962C8B-B14F-4D97-AF65-F5344CB8AC3E}">
-        <p14:creationId xmlns:p14="http://schemas.microsoft.com/office/powerpoint/2010/main" val="880166617"/>
-      </p:ext>
-    </p:extLst>
-  </p:cSld>
-  <p:clrMapOvr>
-    <a:masterClrMapping/>
-  </p:clrMapOvr>
-  <p:timing>
-    <p:tnLst>
-      <p:par>
-        <p:cTn xmlns:p14="http://schemas.microsoft.com/office/powerpoint/2010/main" id="1" dur="indefinite" restart="never" nodeType="tmRoot"/>
+        <p:cTn id="1" dur="indefinite" restart="never" nodeType="tmRoot"/>
       </p:par>
     </p:tnLst>
   </p:timing>
@@ -7293,7 +7102,7 @@
   <p:timing>
     <p:tnLst>
       <p:par>
-        <p:cTn xmlns:p14="http://schemas.microsoft.com/office/powerpoint/2010/main" id="1" dur="indefinite" restart="never" nodeType="tmRoot">
+        <p:cTn id="1" dur="indefinite" restart="never" nodeType="tmRoot">
           <p:childTnLst>
             <p:seq concurrent="1" nextAc="seek">
               <p:cTn id="2" dur="indefinite" nodeType="mainSeq">
@@ -7912,7 +7721,7 @@
   <p:timing>
     <p:tnLst>
       <p:par>
-        <p:cTn xmlns:p14="http://schemas.microsoft.com/office/powerpoint/2010/main" id="1" dur="indefinite" restart="never" nodeType="tmRoot">
+        <p:cTn id="1" dur="indefinite" restart="never" nodeType="tmRoot">
           <p:childTnLst>
             <p:seq concurrent="1" nextAc="seek">
               <p:cTn id="2" dur="indefinite" nodeType="mainSeq">
@@ -8280,7 +8089,7 @@
   <p:timing>
     <p:tnLst>
       <p:par>
-        <p:cTn xmlns:p14="http://schemas.microsoft.com/office/powerpoint/2010/main" id="1" dur="indefinite" restart="never" nodeType="tmRoot">
+        <p:cTn id="1" dur="indefinite" restart="never" nodeType="tmRoot">
           <p:childTnLst>
             <p:seq concurrent="1" nextAc="seek">
               <p:cTn id="2" dur="indefinite" nodeType="mainSeq">
@@ -8439,26 +8248,12 @@
             </a:r>
             <a:r>
               <a:rPr lang="en-GB" dirty="0" smtClean="0"/>
-              <a:t/>
-            </a:r>
-            <a:br>
-              <a:rPr lang="en-GB" dirty="0" smtClean="0"/>
-            </a:br>
-            <a:r>
-              <a:rPr lang="en-GB" dirty="0" smtClean="0"/>
               <a:t>neighbours </a:t>
             </a:r>
             <a:r>
               <a:rPr lang="en-GB" dirty="0"/>
               <a:t>and has a list of </a:t>
             </a:r>
-            <a:r>
-              <a:rPr lang="en-GB" dirty="0" smtClean="0"/>
-              <a:t/>
-            </a:r>
-            <a:br>
-              <a:rPr lang="en-GB" dirty="0" smtClean="0"/>
-            </a:br>
             <a:r>
               <a:rPr lang="en-GB" dirty="0" smtClean="0"/>
               <a:t>agents </a:t>
@@ -8525,36 +8320,6 @@
           </a:p>
         </p:txBody>
       </p:sp>
-      <p:pic>
-        <p:nvPicPr>
-          <p:cNvPr id="4" name="Picture 3"/>
-          <p:cNvPicPr>
-            <a:picLocks noChangeAspect="1"/>
-          </p:cNvPicPr>
-          <p:nvPr/>
-        </p:nvPicPr>
-        <p:blipFill>
-          <a:blip r:embed="rId3">
-            <a:extLst>
-              <a:ext uri="{28A0092B-C50C-407E-A947-70E740481C1C}">
-                <a14:useLocalDpi xmlns:a14="http://schemas.microsoft.com/office/drawing/2010/main" val="0"/>
-              </a:ext>
-            </a:extLst>
-          </a:blip>
-          <a:stretch>
-            <a:fillRect/>
-          </a:stretch>
-        </p:blipFill>
-        <p:spPr>
-          <a:xfrm>
-            <a:off x="6300192" y="2564904"/>
-            <a:ext cx="1800200" cy="1880347"/>
-          </a:xfrm>
-          <a:prstGeom prst="rect">
-            <a:avLst/>
-          </a:prstGeom>
-        </p:spPr>
-      </p:pic>
     </p:spTree>
     <p:extLst>
       <p:ext uri="{BB962C8B-B14F-4D97-AF65-F5344CB8AC3E}">
@@ -8568,7 +8333,7 @@
   <p:timing>
     <p:tnLst>
       <p:par>
-        <p:cTn xmlns:p14="http://schemas.microsoft.com/office/powerpoint/2010/main" id="1" dur="indefinite" restart="never" nodeType="tmRoot">
+        <p:cTn id="1" dur="indefinite" restart="never" nodeType="tmRoot">
           <p:childTnLst>
             <p:seq concurrent="1" nextAc="seek">
               <p:cTn id="2" dur="indefinite" nodeType="mainSeq">
@@ -8692,41 +8457,6 @@
                                   </p:childTnLst>
                                 </p:cTn>
                               </p:par>
-                              <p:par>
-                                <p:cTn id="13" presetID="10" presetClass="entr" presetSubtype="0" fill="hold" nodeType="withEffect">
-                                  <p:stCondLst>
-                                    <p:cond delay="0"/>
-                                  </p:stCondLst>
-                                  <p:childTnLst>
-                                    <p:set>
-                                      <p:cBhvr>
-                                        <p:cTn id="14" dur="1" fill="hold">
-                                          <p:stCondLst>
-                                            <p:cond delay="0"/>
-                                          </p:stCondLst>
-                                        </p:cTn>
-                                        <p:tgtEl>
-                                          <p:spTgt spid="4"/>
-                                        </p:tgtEl>
-                                        <p:attrNameLst>
-                                          <p:attrName>style.visibility</p:attrName>
-                                        </p:attrNameLst>
-                                      </p:cBhvr>
-                                      <p:to>
-                                        <p:strVal val="visible"/>
-                                      </p:to>
-                                    </p:set>
-                                    <p:animEffect transition="in" filter="fade">
-                                      <p:cBhvr>
-                                        <p:cTn id="15" dur="500"/>
-                                        <p:tgtEl>
-                                          <p:spTgt spid="4"/>
-                                        </p:tgtEl>
-                                      </p:cBhvr>
-                                    </p:animEffect>
-                                  </p:childTnLst>
-                                </p:cTn>
-                              </p:par>
                             </p:childTnLst>
                           </p:cTn>
                         </p:par>
@@ -8734,26 +8464,26 @@
                     </p:cTn>
                   </p:par>
                   <p:par>
-                    <p:cTn id="16" fill="hold">
+                    <p:cTn id="13" fill="hold">
                       <p:stCondLst>
                         <p:cond delay="indefinite"/>
                       </p:stCondLst>
                       <p:childTnLst>
                         <p:par>
-                          <p:cTn id="17" fill="hold">
+                          <p:cTn id="14" fill="hold">
                             <p:stCondLst>
                               <p:cond delay="0"/>
                             </p:stCondLst>
                             <p:childTnLst>
                               <p:par>
-                                <p:cTn id="18" presetID="10" presetClass="entr" presetSubtype="0" fill="hold" grpId="0" nodeType="clickEffect">
+                                <p:cTn id="15" presetID="10" presetClass="entr" presetSubtype="0" fill="hold" grpId="0" nodeType="clickEffect">
                                   <p:stCondLst>
                                     <p:cond delay="0"/>
                                   </p:stCondLst>
                                   <p:childTnLst>
                                     <p:set>
                                       <p:cBhvr>
-                                        <p:cTn id="19" dur="1" fill="hold">
+                                        <p:cTn id="16" dur="1" fill="hold">
                                           <p:stCondLst>
                                             <p:cond delay="0"/>
                                           </p:stCondLst>
@@ -8775,7 +8505,7 @@
                                     </p:set>
                                     <p:animEffect transition="in" filter="fade">
                                       <p:cBhvr>
-                                        <p:cTn id="20" dur="500"/>
+                                        <p:cTn id="17" dur="500"/>
                                         <p:tgtEl>
                                           <p:spTgt spid="2">
                                             <p:txEl>
@@ -8880,7 +8610,15 @@
             </a:pPr>
             <a:r>
               <a:rPr lang="en-GB" dirty="0"/>
-              <a:t>Each agent is assigned a set of possible tasks</a:t>
+              <a:t>Each agent </a:t>
+            </a:r>
+            <a:r>
+              <a:rPr lang="en-GB" dirty="0" smtClean="0"/>
+              <a:t>is </a:t>
+            </a:r>
+            <a:r>
+              <a:rPr lang="en-GB" dirty="0"/>
+              <a:t>assigned a set of possible tasks</a:t>
             </a:r>
             <a:r>
               <a:rPr lang="en-US" dirty="0"/>
@@ -8895,16 +8633,21 @@
             </a:pPr>
             <a:r>
               <a:rPr lang="en-US" dirty="0"/>
-              <a:t>The agent is able to choose which task to perform depending on the context, like real ants do</a:t>
-            </a:r>
-            <a:r>
-              <a:rPr lang="en-US" baseline="30000" dirty="0"/>
-              <a:t>[2]</a:t>
-            </a:r>
-            <a:r>
-              <a:rPr lang="en-US" dirty="0"/>
+              <a:t>The agent is able to choose which task to perform depending on the context, like real ants </a:t>
+            </a:r>
+            <a:r>
+              <a:rPr lang="en-US" dirty="0" smtClean="0"/>
+              <a:t>do</a:t>
+            </a:r>
+            <a:r>
+              <a:rPr lang="en-US" baseline="30000" dirty="0" smtClean="0"/>
+              <a:t>[3]</a:t>
+            </a:r>
+            <a:r>
+              <a:rPr lang="en-US" dirty="0" smtClean="0"/>
               <a:t>;</a:t>
             </a:r>
+            <a:endParaRPr lang="en-US" dirty="0"/>
           </a:p>
           <a:p>
             <a:pPr>
@@ -8914,7 +8657,15 @@
             </a:pPr>
             <a:r>
               <a:rPr lang="en-US" dirty="0"/>
-              <a:t>Each agent is ran as an independent thread in the available CPUs.</a:t>
+              <a:t>Each agent is </a:t>
+            </a:r>
+            <a:r>
+              <a:rPr lang="en-US" dirty="0" smtClean="0"/>
+              <a:t>run </a:t>
+            </a:r>
+            <a:r>
+              <a:rPr lang="en-US" dirty="0"/>
+              <a:t>as an independent thread in the available CPUs.</a:t>
             </a:r>
           </a:p>
         </p:txBody>
@@ -9001,7 +8752,7 @@
   <p:timing>
     <p:tnLst>
       <p:par>
-        <p:cTn xmlns:p14="http://schemas.microsoft.com/office/powerpoint/2010/main" id="1" dur="indefinite" restart="never" nodeType="tmRoot">
+        <p:cTn id="1" dur="indefinite" restart="never" nodeType="tmRoot">
           <p:childTnLst>
             <p:seq concurrent="1" nextAc="seek">
               <p:cTn id="2" dur="indefinite" nodeType="mainSeq">
@@ -9322,9 +9073,9 @@
       </p:sp>
       <p:pic>
         <p:nvPicPr>
-          <p:cNvPr id="6" name="Picture 5"/>
+          <p:cNvPr id="2051" name="Picture 3" descr="C:\Users\luiza\Documents\repositories\personal\project\msc-project\uml\class-06-07.png"/>
           <p:cNvPicPr>
-            <a:picLocks noChangeAspect="1"/>
+            <a:picLocks noChangeAspect="1" noChangeArrowheads="1"/>
           </p:cNvPicPr>
           <p:nvPr/>
         </p:nvPicPr>
@@ -9336,18 +9087,29 @@
               </a:ext>
             </a:extLst>
           </a:blip>
+          <a:srcRect/>
           <a:stretch>
             <a:fillRect/>
           </a:stretch>
         </p:blipFill>
-        <p:spPr>
+        <p:spPr bwMode="auto">
           <a:xfrm>
-            <a:off x="658319" y="1412776"/>
-            <a:ext cx="7827362" cy="4320480"/>
+            <a:off x="539552" y="1139262"/>
+            <a:ext cx="7979991" cy="4810018"/>
           </a:xfrm>
           <a:prstGeom prst="rect">
             <a:avLst/>
           </a:prstGeom>
+          <a:noFill/>
+          <a:extLst>
+            <a:ext uri="{909E8E84-426E-40DD-AFC4-6F175D3DCCD1}">
+              <a14:hiddenFill xmlns:a14="http://schemas.microsoft.com/office/drawing/2010/main">
+                <a:solidFill>
+                  <a:srgbClr val="FFFFFF"/>
+                </a:solidFill>
+              </a14:hiddenFill>
+            </a:ext>
+          </a:extLst>
         </p:spPr>
       </p:pic>
     </p:spTree>
@@ -9363,7 +9125,7 @@
   <p:timing>
     <p:tnLst>
       <p:par>
-        <p:cTn xmlns:p14="http://schemas.microsoft.com/office/powerpoint/2010/main" id="1" dur="indefinite" restart="never" nodeType="tmRoot"/>
+        <p:cTn id="1" dur="indefinite" restart="never" nodeType="tmRoot"/>
       </p:par>
     </p:tnLst>
   </p:timing>
@@ -9550,7 +9312,7 @@
   <p:timing>
     <p:tnLst>
       <p:par>
-        <p:cTn xmlns:p14="http://schemas.microsoft.com/office/powerpoint/2010/main" id="1" dur="indefinite" restart="never" nodeType="tmRoot">
+        <p:cTn id="1" dur="indefinite" restart="never" nodeType="tmRoot">
           <p:childTnLst>
             <p:seq concurrent="1" nextAc="seek">
               <p:cTn id="2" dur="indefinite" nodeType="mainSeq">
@@ -9893,7 +9655,7 @@
           <a:graphicData uri="http://schemas.openxmlformats.org/presentationml/2006/ole">
             <mc:AlternateContent xmlns:mc="http://schemas.openxmlformats.org/markup-compatibility/2006">
               <mc:Choice xmlns:v="urn:schemas-microsoft-com:vml" Requires="v">
-                <p:oleObj spid="_x0000_s1061" name="Equation" r:id="rId4" imgW="914400" imgH="406400" progId="Equation.3">
+                <p:oleObj spid="_x0000_s1069" name="Equation" r:id="rId4" imgW="914400" imgH="406400" progId="Equation.3">
                   <p:embed/>
                 </p:oleObj>
               </mc:Choice>
@@ -10005,7 +9767,7 @@
   <p:timing>
     <p:tnLst>
       <p:par>
-        <p:cTn xmlns:p14="http://schemas.microsoft.com/office/powerpoint/2010/main" id="1" dur="indefinite" restart="never" nodeType="tmRoot"/>
+        <p:cTn id="1" dur="indefinite" restart="never" nodeType="tmRoot"/>
       </p:par>
     </p:tnLst>
   </p:timing>

</xml_diff>

<commit_message>
ForgeTask created, simulation rendered image added to presentation
</commit_message>
<xml_diff>
--- a/presentation-june/Presentation.pptx
+++ b/presentation-june/Presentation.pptx
@@ -5,7 +5,7 @@
     <p:sldMasterId id="2147483648" r:id="rId1"/>
   </p:sldMasterIdLst>
   <p:notesMasterIdLst>
-    <p:notesMasterId r:id="rId15"/>
+    <p:notesMasterId r:id="rId16"/>
   </p:notesMasterIdLst>
   <p:sldIdLst>
     <p:sldId id="256" r:id="rId2"/>
@@ -19,8 +19,9 @@
     <p:sldId id="271" r:id="rId10"/>
     <p:sldId id="264" r:id="rId11"/>
     <p:sldId id="265" r:id="rId12"/>
-    <p:sldId id="266" r:id="rId13"/>
-    <p:sldId id="272" r:id="rId14"/>
+    <p:sldId id="273" r:id="rId13"/>
+    <p:sldId id="266" r:id="rId14"/>
+    <p:sldId id="272" r:id="rId15"/>
   </p:sldIdLst>
   <p:sldSz cx="9144000" cy="6858000" type="screen4x3"/>
   <p:notesSz cx="6858000" cy="9144000"/>
@@ -599,7 +600,7 @@
             </a:lvl1pPr>
           </a:lstStyle>
           <a:p>
-            <a:endParaRPr lang="en-GB"/>
+            <a:endParaRPr lang="en-GB" dirty="0"/>
           </a:p>
         </p:txBody>
       </p:sp>
@@ -634,7 +635,7 @@
               <a:rPr lang="en-GB" smtClean="0"/>
               <a:t>07/06/2012</a:t>
             </a:fld>
-            <a:endParaRPr lang="en-GB"/>
+            <a:endParaRPr lang="en-GB" dirty="0"/>
           </a:p>
         </p:txBody>
       </p:sp>
@@ -667,7 +668,7 @@
           <a:bodyPr vert="horz" lIns="91440" tIns="45720" rIns="91440" bIns="45720" rtlCol="0" anchor="ctr"/>
           <a:lstStyle/>
           <a:p>
-            <a:endParaRPr lang="en-GB"/>
+            <a:endParaRPr lang="en-GB" dirty="0"/>
           </a:p>
         </p:txBody>
       </p:sp>
@@ -758,7 +759,7 @@
             </a:lvl1pPr>
           </a:lstStyle>
           <a:p>
-            <a:endParaRPr lang="en-GB"/>
+            <a:endParaRPr lang="en-GB" dirty="0"/>
           </a:p>
         </p:txBody>
       </p:sp>
@@ -793,7 +794,7 @@
               <a:rPr lang="en-GB" smtClean="0"/>
               <a:t>‹#›</a:t>
             </a:fld>
-            <a:endParaRPr lang="en-GB"/>
+            <a:endParaRPr lang="en-GB" dirty="0"/>
           </a:p>
         </p:txBody>
       </p:sp>
@@ -1709,7 +1710,7 @@
               <a:rPr lang="en-GB" smtClean="0"/>
               <a:t>07/06/2012</a:t>
             </a:fld>
-            <a:endParaRPr lang="en-GB"/>
+            <a:endParaRPr lang="en-GB" dirty="0"/>
           </a:p>
         </p:txBody>
       </p:sp>
@@ -1728,7 +1729,7 @@
           <a:bodyPr/>
           <a:lstStyle/>
           <a:p>
-            <a:endParaRPr lang="en-GB"/>
+            <a:endParaRPr lang="en-GB" dirty="0"/>
           </a:p>
         </p:txBody>
       </p:sp>
@@ -1751,7 +1752,7 @@
               <a:rPr lang="en-GB" smtClean="0"/>
               <a:t>‹#›</a:t>
             </a:fld>
-            <a:endParaRPr lang="en-GB"/>
+            <a:endParaRPr lang="en-GB" dirty="0"/>
           </a:p>
         </p:txBody>
       </p:sp>
@@ -1886,7 +1887,7 @@
               <a:rPr lang="en-GB" smtClean="0"/>
               <a:t>07/06/2012</a:t>
             </a:fld>
-            <a:endParaRPr lang="en-GB"/>
+            <a:endParaRPr lang="en-GB" dirty="0"/>
           </a:p>
         </p:txBody>
       </p:sp>
@@ -1905,7 +1906,7 @@
           <a:bodyPr/>
           <a:lstStyle/>
           <a:p>
-            <a:endParaRPr lang="en-GB"/>
+            <a:endParaRPr lang="en-GB" dirty="0"/>
           </a:p>
         </p:txBody>
       </p:sp>
@@ -1928,7 +1929,7 @@
               <a:rPr lang="en-GB" smtClean="0"/>
               <a:t>‹#›</a:t>
             </a:fld>
-            <a:endParaRPr lang="en-GB"/>
+            <a:endParaRPr lang="en-GB" dirty="0"/>
           </a:p>
         </p:txBody>
       </p:sp>
@@ -2066,7 +2067,7 @@
               <a:rPr lang="en-GB" smtClean="0"/>
               <a:t>07/06/2012</a:t>
             </a:fld>
-            <a:endParaRPr lang="en-GB"/>
+            <a:endParaRPr lang="en-GB" dirty="0"/>
           </a:p>
         </p:txBody>
       </p:sp>
@@ -2085,7 +2086,7 @@
           <a:bodyPr/>
           <a:lstStyle/>
           <a:p>
-            <a:endParaRPr lang="en-GB"/>
+            <a:endParaRPr lang="en-GB" dirty="0"/>
           </a:p>
         </p:txBody>
       </p:sp>
@@ -2108,7 +2109,7 @@
               <a:rPr lang="en-GB" smtClean="0"/>
               <a:t>‹#›</a:t>
             </a:fld>
-            <a:endParaRPr lang="en-GB"/>
+            <a:endParaRPr lang="en-GB" dirty="0"/>
           </a:p>
         </p:txBody>
       </p:sp>
@@ -2248,7 +2249,7 @@
               <a:rPr lang="en-GB" smtClean="0"/>
               <a:t>07/06/2012</a:t>
             </a:fld>
-            <a:endParaRPr lang="en-GB"/>
+            <a:endParaRPr lang="en-GB" dirty="0"/>
           </a:p>
         </p:txBody>
       </p:sp>
@@ -2267,7 +2268,7 @@
           <a:bodyPr/>
           <a:lstStyle/>
           <a:p>
-            <a:endParaRPr lang="en-GB"/>
+            <a:endParaRPr lang="en-GB" dirty="0"/>
           </a:p>
         </p:txBody>
       </p:sp>
@@ -2290,7 +2291,7 @@
               <a:rPr lang="en-GB" smtClean="0"/>
               <a:t>‹#›</a:t>
             </a:fld>
-            <a:endParaRPr lang="en-GB"/>
+            <a:endParaRPr lang="en-GB" dirty="0"/>
           </a:p>
         </p:txBody>
       </p:sp>
@@ -2547,7 +2548,7 @@
               <a:rPr lang="en-GB" smtClean="0"/>
               <a:t>07/06/2012</a:t>
             </a:fld>
-            <a:endParaRPr lang="en-GB"/>
+            <a:endParaRPr lang="en-GB" dirty="0"/>
           </a:p>
         </p:txBody>
       </p:sp>
@@ -2566,7 +2567,7 @@
           <a:bodyPr/>
           <a:lstStyle/>
           <a:p>
-            <a:endParaRPr lang="en-GB"/>
+            <a:endParaRPr lang="en-GB" dirty="0"/>
           </a:p>
         </p:txBody>
       </p:sp>
@@ -2589,7 +2590,7 @@
               <a:rPr lang="en-GB" smtClean="0"/>
               <a:t>‹#›</a:t>
             </a:fld>
-            <a:endParaRPr lang="en-GB"/>
+            <a:endParaRPr lang="en-GB" dirty="0"/>
           </a:p>
         </p:txBody>
       </p:sp>
@@ -2835,7 +2836,7 @@
               <a:rPr lang="en-GB" smtClean="0"/>
               <a:t>07/06/2012</a:t>
             </a:fld>
-            <a:endParaRPr lang="en-GB"/>
+            <a:endParaRPr lang="en-GB" dirty="0"/>
           </a:p>
         </p:txBody>
       </p:sp>
@@ -2854,7 +2855,7 @@
           <a:bodyPr/>
           <a:lstStyle/>
           <a:p>
-            <a:endParaRPr lang="en-GB"/>
+            <a:endParaRPr lang="en-GB" dirty="0"/>
           </a:p>
         </p:txBody>
       </p:sp>
@@ -2877,7 +2878,7 @@
               <a:rPr lang="en-GB" smtClean="0"/>
               <a:t>‹#›</a:t>
             </a:fld>
-            <a:endParaRPr lang="en-GB"/>
+            <a:endParaRPr lang="en-GB" dirty="0"/>
           </a:p>
         </p:txBody>
       </p:sp>
@@ -3257,7 +3258,7 @@
               <a:rPr lang="en-GB" smtClean="0"/>
               <a:t>07/06/2012</a:t>
             </a:fld>
-            <a:endParaRPr lang="en-GB"/>
+            <a:endParaRPr lang="en-GB" dirty="0"/>
           </a:p>
         </p:txBody>
       </p:sp>
@@ -3276,7 +3277,7 @@
           <a:bodyPr/>
           <a:lstStyle/>
           <a:p>
-            <a:endParaRPr lang="en-GB"/>
+            <a:endParaRPr lang="en-GB" dirty="0"/>
           </a:p>
         </p:txBody>
       </p:sp>
@@ -3299,7 +3300,7 @@
               <a:rPr lang="en-GB" smtClean="0"/>
               <a:t>‹#›</a:t>
             </a:fld>
-            <a:endParaRPr lang="en-GB"/>
+            <a:endParaRPr lang="en-GB" dirty="0"/>
           </a:p>
         </p:txBody>
       </p:sp>
@@ -3375,7 +3376,7 @@
               <a:rPr lang="en-GB" smtClean="0"/>
               <a:t>07/06/2012</a:t>
             </a:fld>
-            <a:endParaRPr lang="en-GB"/>
+            <a:endParaRPr lang="en-GB" dirty="0"/>
           </a:p>
         </p:txBody>
       </p:sp>
@@ -3394,7 +3395,7 @@
           <a:bodyPr/>
           <a:lstStyle/>
           <a:p>
-            <a:endParaRPr lang="en-GB"/>
+            <a:endParaRPr lang="en-GB" dirty="0"/>
           </a:p>
         </p:txBody>
       </p:sp>
@@ -3417,7 +3418,7 @@
               <a:rPr lang="en-GB" smtClean="0"/>
               <a:t>‹#›</a:t>
             </a:fld>
-            <a:endParaRPr lang="en-GB"/>
+            <a:endParaRPr lang="en-GB" dirty="0"/>
           </a:p>
         </p:txBody>
       </p:sp>
@@ -3470,7 +3471,7 @@
               <a:rPr lang="en-GB" smtClean="0"/>
               <a:t>07/06/2012</a:t>
             </a:fld>
-            <a:endParaRPr lang="en-GB"/>
+            <a:endParaRPr lang="en-GB" dirty="0"/>
           </a:p>
         </p:txBody>
       </p:sp>
@@ -3489,7 +3490,7 @@
           <a:bodyPr/>
           <a:lstStyle/>
           <a:p>
-            <a:endParaRPr lang="en-GB"/>
+            <a:endParaRPr lang="en-GB" dirty="0"/>
           </a:p>
         </p:txBody>
       </p:sp>
@@ -3512,7 +3513,7 @@
               <a:rPr lang="en-GB" smtClean="0"/>
               <a:t>‹#›</a:t>
             </a:fld>
-            <a:endParaRPr lang="en-GB"/>
+            <a:endParaRPr lang="en-GB" dirty="0"/>
           </a:p>
         </p:txBody>
       </p:sp>
@@ -3747,7 +3748,7 @@
               <a:rPr lang="en-GB" smtClean="0"/>
               <a:t>07/06/2012</a:t>
             </a:fld>
-            <a:endParaRPr lang="en-GB"/>
+            <a:endParaRPr lang="en-GB" dirty="0"/>
           </a:p>
         </p:txBody>
       </p:sp>
@@ -3766,7 +3767,7 @@
           <a:bodyPr/>
           <a:lstStyle/>
           <a:p>
-            <a:endParaRPr lang="en-GB"/>
+            <a:endParaRPr lang="en-GB" dirty="0"/>
           </a:p>
         </p:txBody>
       </p:sp>
@@ -3789,7 +3790,7 @@
               <a:rPr lang="en-GB" smtClean="0"/>
               <a:t>‹#›</a:t>
             </a:fld>
-            <a:endParaRPr lang="en-GB"/>
+            <a:endParaRPr lang="en-GB" dirty="0"/>
           </a:p>
         </p:txBody>
       </p:sp>
@@ -3912,7 +3913,7 @@
             </a:lvl9pPr>
           </a:lstStyle>
           <a:p>
-            <a:endParaRPr lang="en-GB"/>
+            <a:endParaRPr lang="en-GB" dirty="0"/>
           </a:p>
         </p:txBody>
       </p:sp>
@@ -4000,7 +4001,7 @@
               <a:rPr lang="en-GB" smtClean="0"/>
               <a:t>07/06/2012</a:t>
             </a:fld>
-            <a:endParaRPr lang="en-GB"/>
+            <a:endParaRPr lang="en-GB" dirty="0"/>
           </a:p>
         </p:txBody>
       </p:sp>
@@ -4019,7 +4020,7 @@
           <a:bodyPr/>
           <a:lstStyle/>
           <a:p>
-            <a:endParaRPr lang="en-GB"/>
+            <a:endParaRPr lang="en-GB" dirty="0"/>
           </a:p>
         </p:txBody>
       </p:sp>
@@ -4042,7 +4043,7 @@
               <a:rPr lang="en-GB" smtClean="0"/>
               <a:t>‹#›</a:t>
             </a:fld>
-            <a:endParaRPr lang="en-GB"/>
+            <a:endParaRPr lang="en-GB" dirty="0"/>
           </a:p>
         </p:txBody>
       </p:sp>
@@ -4213,7 +4214,7 @@
               <a:rPr lang="en-GB" smtClean="0"/>
               <a:t>07/06/2012</a:t>
             </a:fld>
-            <a:endParaRPr lang="en-GB"/>
+            <a:endParaRPr lang="en-GB" dirty="0"/>
           </a:p>
         </p:txBody>
       </p:sp>
@@ -4250,7 +4251,7 @@
             </a:lvl1pPr>
           </a:lstStyle>
           <a:p>
-            <a:endParaRPr lang="en-GB"/>
+            <a:endParaRPr lang="en-GB" dirty="0"/>
           </a:p>
         </p:txBody>
       </p:sp>
@@ -4291,7 +4292,7 @@
               <a:rPr lang="en-GB" smtClean="0"/>
               <a:t>‹#›</a:t>
             </a:fld>
-            <a:endParaRPr lang="en-GB"/>
+            <a:endParaRPr lang="en-GB" dirty="0"/>
           </a:p>
         </p:txBody>
       </p:sp>
@@ -4651,7 +4652,7 @@
           </a:p>
           <a:p>
             <a:r>
-              <a:rPr lang="en-GB" sz="1600" dirty="0" err="1" smtClean="0">
+              <a:rPr lang="en-GB" sz="1600" dirty="0" smtClean="0">
                 <a:solidFill>
                   <a:schemeClr val="accent5">
                     <a:lumMod val="75000"/>
@@ -4660,13 +4661,6 @@
               </a:rPr>
               <a:t>luiz_filipe.abrahao@kcl.ac.uk</a:t>
             </a:r>
-            <a:endParaRPr lang="en-GB" sz="1600" dirty="0" smtClean="0">
-              <a:solidFill>
-                <a:schemeClr val="accent5">
-                  <a:lumMod val="75000"/>
-                </a:schemeClr>
-              </a:solidFill>
-            </a:endParaRPr>
           </a:p>
         </p:txBody>
       </p:sp>
@@ -5662,6 +5656,229 @@
           <a:p>
             <a:r>
               <a:rPr lang="en-GB" dirty="0" smtClean="0"/>
+              <a:t>Current Work</a:t>
+            </a:r>
+            <a:endParaRPr lang="en-GB" dirty="0"/>
+          </a:p>
+        </p:txBody>
+      </p:sp>
+      <p:cxnSp>
+        <p:nvCxnSpPr>
+          <p:cNvPr id="6" name="Straight Arrow Connector 5"/>
+          <p:cNvCxnSpPr/>
+          <p:nvPr/>
+        </p:nvCxnSpPr>
+        <p:spPr>
+          <a:xfrm>
+            <a:off x="765593" y="1885836"/>
+            <a:ext cx="792088" cy="0"/>
+          </a:xfrm>
+          <a:prstGeom prst="straightConnector1">
+            <a:avLst/>
+          </a:prstGeom>
+          <a:ln w="38100">
+            <a:solidFill>
+              <a:schemeClr val="bg1">
+                <a:lumMod val="65000"/>
+              </a:schemeClr>
+            </a:solidFill>
+            <a:headEnd type="none" w="med" len="med"/>
+            <a:tailEnd type="triangle" w="med" len="med"/>
+          </a:ln>
+        </p:spPr>
+        <p:style>
+          <a:lnRef idx="1">
+            <a:schemeClr val="accent1"/>
+          </a:lnRef>
+          <a:fillRef idx="0">
+            <a:schemeClr val="accent1"/>
+          </a:fillRef>
+          <a:effectRef idx="0">
+            <a:schemeClr val="accent1"/>
+          </a:effectRef>
+          <a:fontRef idx="minor">
+            <a:schemeClr val="tx1"/>
+          </a:fontRef>
+        </p:style>
+      </p:cxnSp>
+      <p:cxnSp>
+        <p:nvCxnSpPr>
+          <p:cNvPr id="9" name="Straight Arrow Connector 8"/>
+          <p:cNvCxnSpPr/>
+          <p:nvPr/>
+        </p:nvCxnSpPr>
+        <p:spPr>
+          <a:xfrm flipH="1">
+            <a:off x="781090" y="1870338"/>
+            <a:ext cx="1" cy="792088"/>
+          </a:xfrm>
+          <a:prstGeom prst="straightConnector1">
+            <a:avLst/>
+          </a:prstGeom>
+          <a:ln w="38100">
+            <a:solidFill>
+              <a:schemeClr val="bg1">
+                <a:lumMod val="65000"/>
+              </a:schemeClr>
+            </a:solidFill>
+            <a:headEnd type="none" w="med" len="med"/>
+            <a:tailEnd type="triangle" w="med" len="med"/>
+          </a:ln>
+        </p:spPr>
+        <p:style>
+          <a:lnRef idx="1">
+            <a:schemeClr val="accent1"/>
+          </a:lnRef>
+          <a:fillRef idx="0">
+            <a:schemeClr val="accent1"/>
+          </a:fillRef>
+          <a:effectRef idx="0">
+            <a:schemeClr val="accent1"/>
+          </a:effectRef>
+          <a:fontRef idx="minor">
+            <a:schemeClr val="tx1"/>
+          </a:fontRef>
+        </p:style>
+      </p:cxnSp>
+      <p:pic>
+        <p:nvPicPr>
+          <p:cNvPr id="2052" name="Picture 4" descr="C:\Users\luiza\Documents\repositories\personal\project\msc-project\msc-model\target\explored-space-phero.png"/>
+          <p:cNvPicPr>
+            <a:picLocks noChangeAspect="1" noChangeArrowheads="1"/>
+          </p:cNvPicPr>
+          <p:nvPr/>
+        </p:nvPicPr>
+        <p:blipFill>
+          <a:blip r:embed="rId2">
+            <a:extLst>
+              <a:ext uri="{28A0092B-C50C-407E-A947-70E740481C1C}">
+                <a14:useLocalDpi xmlns:a14="http://schemas.microsoft.com/office/drawing/2010/main" val="0"/>
+              </a:ext>
+            </a:extLst>
+          </a:blip>
+          <a:srcRect/>
+          <a:stretch>
+            <a:fillRect/>
+          </a:stretch>
+        </p:blipFill>
+        <p:spPr bwMode="auto">
+          <a:xfrm>
+            <a:off x="938808" y="2055862"/>
+            <a:ext cx="1905000" cy="2381250"/>
+          </a:xfrm>
+          <a:prstGeom prst="rect">
+            <a:avLst/>
+          </a:prstGeom>
+          <a:noFill/>
+          <a:ln>
+            <a:solidFill>
+              <a:schemeClr val="bg1">
+                <a:lumMod val="65000"/>
+              </a:schemeClr>
+            </a:solidFill>
+          </a:ln>
+          <a:extLst>
+            <a:ext uri="{909E8E84-426E-40DD-AFC4-6F175D3DCCD1}">
+              <a14:hiddenFill xmlns:a14="http://schemas.microsoft.com/office/drawing/2010/main">
+                <a:solidFill>
+                  <a:srgbClr val="FFFFFF"/>
+                </a:solidFill>
+              </a14:hiddenFill>
+            </a:ext>
+          </a:extLst>
+        </p:spPr>
+      </p:pic>
+      <p:sp>
+        <p:nvSpPr>
+          <p:cNvPr id="10" name="TextBox 9"/>
+          <p:cNvSpPr txBox="1"/>
+          <p:nvPr/>
+        </p:nvSpPr>
+        <p:spPr>
+          <a:xfrm>
+            <a:off x="760742" y="4551511"/>
+            <a:ext cx="2371098" cy="461665"/>
+          </a:xfrm>
+          <a:prstGeom prst="rect">
+            <a:avLst/>
+          </a:prstGeom>
+          <a:noFill/>
+        </p:spPr>
+        <p:txBody>
+          <a:bodyPr wrap="none" rtlCol="0">
+            <a:spAutoFit/>
+          </a:bodyPr>
+          <a:lstStyle/>
+          <a:p>
+            <a:pPr algn="ctr"/>
+            <a:r>
+              <a:rPr lang="en-GB" sz="1200" b="1" dirty="0" smtClean="0"/>
+              <a:t>50 000 nodes, 10 agents randomly</a:t>
+            </a:r>
+          </a:p>
+          <a:p>
+            <a:pPr algn="ctr"/>
+            <a:r>
+              <a:rPr lang="en-GB" sz="1200" b="1" dirty="0" smtClean="0"/>
+              <a:t> moving through space</a:t>
+            </a:r>
+          </a:p>
+        </p:txBody>
+      </p:sp>
+    </p:spTree>
+    <p:extLst>
+      <p:ext uri="{BB962C8B-B14F-4D97-AF65-F5344CB8AC3E}">
+        <p14:creationId xmlns:p14="http://schemas.microsoft.com/office/powerpoint/2010/main" val="2699782112"/>
+      </p:ext>
+    </p:extLst>
+  </p:cSld>
+  <p:clrMapOvr>
+    <a:masterClrMapping/>
+  </p:clrMapOvr>
+  <p:timing>
+    <p:tnLst>
+      <p:par>
+        <p:cTn id="1" dur="indefinite" restart="never" nodeType="tmRoot"/>
+      </p:par>
+    </p:tnLst>
+  </p:timing>
+</p:sld>
+</file>
+
+<file path=ppt/slides/slide13.xml><?xml version="1.0" encoding="utf-8"?>
+<p:sld xmlns:a="http://schemas.openxmlformats.org/drawingml/2006/main" xmlns:r="http://schemas.openxmlformats.org/officeDocument/2006/relationships" xmlns:p="http://schemas.openxmlformats.org/presentationml/2006/main">
+  <p:cSld>
+    <p:spTree>
+      <p:nvGrpSpPr>
+        <p:cNvPr id="1" name=""/>
+        <p:cNvGrpSpPr/>
+        <p:nvPr/>
+      </p:nvGrpSpPr>
+      <p:grpSpPr>
+        <a:xfrm>
+          <a:off x="0" y="0"/>
+          <a:ext cx="0" cy="0"/>
+          <a:chOff x="0" y="0"/>
+          <a:chExt cx="0" cy="0"/>
+        </a:xfrm>
+      </p:grpSpPr>
+      <p:sp>
+        <p:nvSpPr>
+          <p:cNvPr id="3" name="Title 2"/>
+          <p:cNvSpPr>
+            <a:spLocks noGrp="1"/>
+          </p:cNvSpPr>
+          <p:nvPr>
+            <p:ph type="title"/>
+          </p:nvPr>
+        </p:nvSpPr>
+        <p:spPr/>
+        <p:txBody>
+          <a:bodyPr/>
+          <a:lstStyle/>
+          <a:p>
+            <a:r>
+              <a:rPr lang="en-GB" dirty="0" smtClean="0"/>
               <a:t>Challenges</a:t>
             </a:r>
             <a:endParaRPr lang="en-GB" dirty="0"/>
@@ -5949,7 +6166,7 @@
 </p:sld>
 </file>
 
-<file path=ppt/slides/slide13.xml><?xml version="1.0" encoding="utf-8"?>
+<file path=ppt/slides/slide14.xml><?xml version="1.0" encoding="utf-8"?>
 <p:sld xmlns:a="http://schemas.openxmlformats.org/drawingml/2006/main" xmlns:r="http://schemas.openxmlformats.org/officeDocument/2006/relationships" xmlns:p="http://schemas.openxmlformats.org/presentationml/2006/main">
   <p:cSld>
     <p:spTree>
@@ -6283,7 +6500,7 @@
           <a:lstStyle/>
           <a:p>
             <a:pPr algn="ctr"/>
-            <a:endParaRPr lang="en-GB"/>
+            <a:endParaRPr lang="en-GB" dirty="0"/>
           </a:p>
         </p:txBody>
       </p:sp>
@@ -6367,7 +6584,7 @@
           <a:lstStyle/>
           <a:p>
             <a:pPr algn="ctr"/>
-            <a:endParaRPr lang="en-GB"/>
+            <a:endParaRPr lang="en-GB" dirty="0"/>
           </a:p>
         </p:txBody>
       </p:sp>
@@ -6699,7 +6916,7 @@
           <a:lstStyle/>
           <a:p>
             <a:pPr algn="ctr"/>
-            <a:endParaRPr lang="en-GB"/>
+            <a:endParaRPr lang="en-GB" dirty="0"/>
           </a:p>
         </p:txBody>
       </p:sp>
@@ -6780,7 +6997,7 @@
           <a:lstStyle/>
           <a:p>
             <a:pPr algn="ctr"/>
-            <a:endParaRPr lang="en-GB"/>
+            <a:endParaRPr lang="en-GB" dirty="0"/>
           </a:p>
         </p:txBody>
       </p:sp>
@@ -6861,7 +7078,7 @@
           <a:lstStyle/>
           <a:p>
             <a:pPr algn="ctr"/>
-            <a:endParaRPr lang="en-GB"/>
+            <a:endParaRPr lang="en-GB" dirty="0"/>
           </a:p>
         </p:txBody>
       </p:sp>
@@ -9655,7 +9872,7 @@
           <a:graphicData uri="http://schemas.openxmlformats.org/presentationml/2006/ole">
             <mc:AlternateContent xmlns:mc="http://schemas.openxmlformats.org/markup-compatibility/2006">
               <mc:Choice xmlns:v="urn:schemas-microsoft-com:vml" Requires="v">
-                <p:oleObj spid="_x0000_s1069" name="Equation" r:id="rId4" imgW="914400" imgH="406400" progId="Equation.3">
+                <p:oleObj spid="_x0000_s1074" name="Equation" r:id="rId4" imgW="914400" imgH="406400" progId="Equation.3">
                   <p:embed/>
                 </p:oleObj>
               </mc:Choice>

</xml_diff>

<commit_message>
Reworking the population render. Final presentation version.
</commit_message>
<xml_diff>
--- a/presentation-june/Presentation.pptx
+++ b/presentation-june/Presentation.pptx
@@ -5,7 +5,7 @@
     <p:sldMasterId id="2147483648" r:id="rId1"/>
   </p:sldMasterIdLst>
   <p:notesMasterIdLst>
-    <p:notesMasterId r:id="rId16"/>
+    <p:notesMasterId r:id="rId15"/>
   </p:notesMasterIdLst>
   <p:sldIdLst>
     <p:sldId id="256" r:id="rId2"/>
@@ -19,9 +19,8 @@
     <p:sldId id="271" r:id="rId10"/>
     <p:sldId id="264" r:id="rId11"/>
     <p:sldId id="265" r:id="rId12"/>
-    <p:sldId id="273" r:id="rId13"/>
-    <p:sldId id="266" r:id="rId14"/>
-    <p:sldId id="272" r:id="rId15"/>
+    <p:sldId id="266" r:id="rId13"/>
+    <p:sldId id="272" r:id="rId14"/>
   </p:sldIdLst>
   <p:sldSz cx="9144000" cy="6858000" type="screen4x3"/>
   <p:notesSz cx="6858000" cy="9144000"/>
@@ -126,7 +125,7 @@
 <file path=ppt/charts/chart1.xml><?xml version="1.0" encoding="utf-8"?>
 <c:chartSpace xmlns:c="http://schemas.openxmlformats.org/drawingml/2006/chart" xmlns:a="http://schemas.openxmlformats.org/drawingml/2006/main" xmlns:r="http://schemas.openxmlformats.org/officeDocument/2006/relationships">
   <c:date1904 val="0"/>
-  <c:lang val="en-GB"/>
+  <c:lang val="en-US"/>
   <c:roundedCorners val="0"/>
   <mc:AlternateContent xmlns:mc="http://schemas.openxmlformats.org/markup-compatibility/2006">
     <mc:Choice xmlns:c14="http://schemas.microsoft.com/office/drawing/2007/8/2/chart" Requires="c14">
@@ -292,10 +291,10 @@
                 <c:formatCode>General</c:formatCode>
                 <c:ptCount val="2"/>
                 <c:pt idx="0">
-                  <c:v>2</c:v>
+                  <c:v>2.0</c:v>
                 </c:pt>
                 <c:pt idx="1">
-                  <c:v>98</c:v>
+                  <c:v>98.0</c:v>
                 </c:pt>
               </c:numCache>
             </c:numRef>
@@ -335,7 +334,7 @@
 <file path=ppt/charts/chart2.xml><?xml version="1.0" encoding="utf-8"?>
 <c:chartSpace xmlns:c="http://schemas.openxmlformats.org/drawingml/2006/chart" xmlns:a="http://schemas.openxmlformats.org/drawingml/2006/main" xmlns:r="http://schemas.openxmlformats.org/officeDocument/2006/relationships">
   <c:date1904 val="0"/>
-  <c:lang val="en-GB"/>
+  <c:lang val="en-US"/>
   <c:roundedCorners val="0"/>
   <mc:AlternateContent xmlns:mc="http://schemas.openxmlformats.org/markup-compatibility/2006">
     <mc:Choice xmlns:c14="http://schemas.microsoft.com/office/drawing/2007/8/2/chart" Requires="c14">
@@ -501,10 +500,10 @@
                 <c:formatCode>General</c:formatCode>
                 <c:ptCount val="2"/>
                 <c:pt idx="0">
-                  <c:v>50</c:v>
+                  <c:v>50.0</c:v>
                 </c:pt>
                 <c:pt idx="1">
-                  <c:v>50</c:v>
+                  <c:v>50.0</c:v>
                 </c:pt>
               </c:numCache>
             </c:numRef>
@@ -1769,7 +1768,7 @@
   <p:timing>
     <p:tnLst>
       <p:par>
-        <p:cTn id="1" dur="indefinite" restart="never" nodeType="tmRoot"/>
+        <p:cTn xmlns:p14="http://schemas.microsoft.com/office/powerpoint/2010/main" id="1" dur="indefinite" restart="never" nodeType="tmRoot"/>
       </p:par>
     </p:tnLst>
   </p:timing>
@@ -2354,7 +2353,7 @@
   <p:timing>
     <p:tnLst>
       <p:par>
-        <p:cTn id="1" dur="indefinite" restart="never" nodeType="tmRoot"/>
+        <p:cTn xmlns:p14="http://schemas.microsoft.com/office/powerpoint/2010/main" id="1" dur="indefinite" restart="never" nodeType="tmRoot"/>
       </p:par>
     </p:tnLst>
   </p:timing>
@@ -4320,7 +4319,7 @@
   <p:timing>
     <p:tnLst>
       <p:par>
-        <p:cTn id="1" dur="indefinite" restart="never" nodeType="tmRoot"/>
+        <p:cTn xmlns:p14="http://schemas.microsoft.com/office/powerpoint/2010/main" id="1" dur="indefinite" restart="never" nodeType="tmRoot"/>
       </p:par>
     </p:tnLst>
   </p:timing>
@@ -4729,14 +4728,14 @@
           </a:ln>
           <a:effectLst/>
           <a:extLst>
-            <a:ext uri="{909E8E84-426E-40DD-AFC4-6F175D3DCCD1}">
+            <a:ext uri="{909E8E84-426E-40dd-AFC4-6F175D3DCCD1}">
               <a14:hiddenFill xmlns:a14="http://schemas.microsoft.com/office/drawing/2010/main">
                 <a:solidFill>
                   <a:schemeClr val="accent1"/>
                 </a:solidFill>
               </a14:hiddenFill>
             </a:ext>
-            <a:ext uri="{91240B29-F687-4F45-9708-019B960494DF}">
+            <a:ext uri="{91240B29-F687-4f45-9708-019B960494DF}">
               <a14:hiddenLine xmlns:a14="http://schemas.microsoft.com/office/drawing/2010/main" w="9525">
                 <a:solidFill>
                   <a:schemeClr val="tx1"/>
@@ -4746,7 +4745,7 @@
                 <a:tailEnd/>
               </a14:hiddenLine>
             </a:ext>
-            <a:ext uri="{AF507438-7753-43E0-B8FC-AC1667EBCBE1}">
+            <a:ext uri="{AF507438-7753-43e0-B8FC-AC1667EBCBE1}">
               <a14:hiddenEffects xmlns:a14="http://schemas.microsoft.com/office/drawing/2010/main">
                 <a:effectLst>
                   <a:outerShdw dist="35921" dir="2700000" algn="ctr" rotWithShape="0">
@@ -4935,7 +4934,7 @@
   <p:timing>
     <p:tnLst>
       <p:par>
-        <p:cTn id="1" dur="indefinite" restart="never" nodeType="tmRoot"/>
+        <p:cTn xmlns:p14="http://schemas.microsoft.com/office/powerpoint/2010/main" id="1" dur="indefinite" restart="never" nodeType="tmRoot"/>
       </p:par>
     </p:tnLst>
   </p:timing>
@@ -5050,7 +5049,7 @@
   <p:timing>
     <p:tnLst>
       <p:par>
-        <p:cTn id="1" dur="indefinite" restart="never" nodeType="tmRoot">
+        <p:cTn xmlns:p14="http://schemas.microsoft.com/office/powerpoint/2010/main" id="1" dur="indefinite" restart="never" nodeType="tmRoot">
           <p:childTnLst>
             <p:seq concurrent="1" nextAc="seek">
               <p:cTn id="2" dur="indefinite" nodeType="mainSeq">
@@ -5300,7 +5299,18 @@
             </a:r>
             <a:r>
               <a:rPr lang="en-GB" dirty="0"/>
-              <a:t>000 nodes and </a:t>
+              <a:t>000 </a:t>
+            </a:r>
+            <a:r>
+              <a:rPr lang="en-GB" dirty="0" smtClean="0"/>
+              <a:t>nodes</a:t>
+            </a:r>
+            <a:br>
+              <a:rPr lang="en-GB" dirty="0" smtClean="0"/>
+            </a:br>
+            <a:r>
+              <a:rPr lang="en-GB" dirty="0" smtClean="0"/>
+              <a:t>and </a:t>
             </a:r>
             <a:r>
               <a:rPr lang="en-GB" dirty="0" smtClean="0"/>
@@ -5308,27 +5318,199 @@
             </a:r>
             <a:r>
               <a:rPr lang="en-GB" dirty="0"/>
-              <a:t>agents;</a:t>
-            </a:r>
-          </a:p>
-          <a:p>
-            <a:pPr>
-              <a:spcBef>
-                <a:spcPts val="3000"/>
-              </a:spcBef>
-            </a:pPr>
-            <a:r>
-              <a:rPr lang="en-GB" dirty="0"/>
-              <a:t>Currently studying what are the best ways to “produce the colony</a:t>
+              <a:t>agents</a:t>
             </a:r>
             <a:r>
               <a:rPr lang="en-GB" dirty="0" smtClean="0"/>
-              <a:t>” and which tasks to implement.</a:t>
+              <a:t>;</a:t>
             </a:r>
             <a:endParaRPr lang="en-GB" dirty="0"/>
           </a:p>
         </p:txBody>
       </p:sp>
+      <p:grpSp>
+        <p:nvGrpSpPr>
+          <p:cNvPr id="2" name="Group 1"/>
+          <p:cNvGrpSpPr/>
+          <p:nvPr/>
+        </p:nvGrpSpPr>
+        <p:grpSpPr>
+          <a:xfrm>
+            <a:off x="6022056" y="2523396"/>
+            <a:ext cx="2715256" cy="3142838"/>
+            <a:chOff x="6022056" y="2523396"/>
+            <a:chExt cx="2715256" cy="3142838"/>
+          </a:xfrm>
+        </p:grpSpPr>
+        <p:cxnSp>
+          <p:nvCxnSpPr>
+            <p:cNvPr id="4" name="Straight Arrow Connector 3"/>
+            <p:cNvCxnSpPr/>
+            <p:nvPr/>
+          </p:nvCxnSpPr>
+          <p:spPr>
+            <a:xfrm>
+              <a:off x="6198985" y="2538894"/>
+              <a:ext cx="792088" cy="0"/>
+            </a:xfrm>
+            <a:prstGeom prst="straightConnector1">
+              <a:avLst/>
+            </a:prstGeom>
+            <a:ln w="38100">
+              <a:solidFill>
+                <a:schemeClr val="bg1">
+                  <a:lumMod val="65000"/>
+                </a:schemeClr>
+              </a:solidFill>
+              <a:headEnd type="none" w="med" len="med"/>
+              <a:tailEnd type="triangle" w="med" len="med"/>
+            </a:ln>
+          </p:spPr>
+          <p:style>
+            <a:lnRef idx="1">
+              <a:schemeClr val="accent1"/>
+            </a:lnRef>
+            <a:fillRef idx="0">
+              <a:schemeClr val="accent1"/>
+            </a:fillRef>
+            <a:effectRef idx="0">
+              <a:schemeClr val="accent1"/>
+            </a:effectRef>
+            <a:fontRef idx="minor">
+              <a:schemeClr val="tx1"/>
+            </a:fontRef>
+          </p:style>
+        </p:cxnSp>
+        <p:cxnSp>
+          <p:nvCxnSpPr>
+            <p:cNvPr id="6" name="Straight Arrow Connector 5"/>
+            <p:cNvCxnSpPr/>
+            <p:nvPr/>
+          </p:nvCxnSpPr>
+          <p:spPr>
+            <a:xfrm flipH="1">
+              <a:off x="6214482" y="2523396"/>
+              <a:ext cx="1" cy="792088"/>
+            </a:xfrm>
+            <a:prstGeom prst="straightConnector1">
+              <a:avLst/>
+            </a:prstGeom>
+            <a:ln w="38100">
+              <a:solidFill>
+                <a:schemeClr val="bg1">
+                  <a:lumMod val="65000"/>
+                </a:schemeClr>
+              </a:solidFill>
+              <a:headEnd type="none" w="med" len="med"/>
+              <a:tailEnd type="triangle" w="med" len="med"/>
+            </a:ln>
+          </p:spPr>
+          <p:style>
+            <a:lnRef idx="1">
+              <a:schemeClr val="accent1"/>
+            </a:lnRef>
+            <a:fillRef idx="0">
+              <a:schemeClr val="accent1"/>
+            </a:fillRef>
+            <a:effectRef idx="0">
+              <a:schemeClr val="accent1"/>
+            </a:effectRef>
+            <a:fontRef idx="minor">
+              <a:schemeClr val="tx1"/>
+            </a:fontRef>
+          </p:style>
+        </p:cxnSp>
+        <p:pic>
+          <p:nvPicPr>
+            <p:cNvPr id="7" name="Picture 4" descr="C:\Users\luiza\Documents\repositories\personal\project\msc-project\msc-model\target\explored-space-phero.png"/>
+            <p:cNvPicPr>
+              <a:picLocks noChangeAspect="1" noChangeArrowheads="1"/>
+            </p:cNvPicPr>
+            <p:nvPr/>
+          </p:nvPicPr>
+          <p:blipFill>
+            <a:blip r:embed="rId2">
+              <a:extLst>
+                <a:ext uri="{28A0092B-C50C-407E-A947-70E740481C1C}">
+                  <a14:useLocalDpi xmlns:a14="http://schemas.microsoft.com/office/drawing/2010/main" val="0"/>
+                </a:ext>
+              </a:extLst>
+            </a:blip>
+            <a:srcRect/>
+            <a:stretch>
+              <a:fillRect/>
+            </a:stretch>
+          </p:blipFill>
+          <p:spPr bwMode="auto">
+            <a:xfrm>
+              <a:off x="6372200" y="2708920"/>
+              <a:ext cx="1905000" cy="2381250"/>
+            </a:xfrm>
+            <a:prstGeom prst="rect">
+              <a:avLst/>
+            </a:prstGeom>
+            <a:noFill/>
+            <a:ln>
+              <a:solidFill>
+                <a:schemeClr val="bg1">
+                  <a:lumMod val="65000"/>
+                </a:schemeClr>
+              </a:solidFill>
+            </a:ln>
+            <a:extLst>
+              <a:ext uri="{909E8E84-426E-40dd-AFC4-6F175D3DCCD1}">
+                <a14:hiddenFill xmlns:a14="http://schemas.microsoft.com/office/drawing/2010/main">
+                  <a:solidFill>
+                    <a:srgbClr val="FFFFFF"/>
+                  </a:solidFill>
+                </a14:hiddenFill>
+              </a:ext>
+            </a:extLst>
+          </p:spPr>
+        </p:pic>
+        <p:sp>
+          <p:nvSpPr>
+            <p:cNvPr id="8" name="TextBox 7"/>
+            <p:cNvSpPr txBox="1"/>
+            <p:nvPr/>
+          </p:nvSpPr>
+          <p:spPr>
+            <a:xfrm>
+              <a:off x="6022056" y="5204569"/>
+              <a:ext cx="2715256" cy="461665"/>
+            </a:xfrm>
+            <a:prstGeom prst="rect">
+              <a:avLst/>
+            </a:prstGeom>
+            <a:noFill/>
+          </p:spPr>
+          <p:txBody>
+            <a:bodyPr wrap="none" rtlCol="0">
+              <a:spAutoFit/>
+            </a:bodyPr>
+            <a:lstStyle/>
+            <a:p>
+              <a:pPr algn="ctr"/>
+              <a:r>
+                <a:rPr lang="en-GB" sz="1200" b="1" dirty="0" smtClean="0"/>
+                <a:t>50 000 nodes, 10 agents randomly</a:t>
+              </a:r>
+            </a:p>
+            <a:p>
+              <a:pPr algn="ctr"/>
+              <a:r>
+                <a:rPr lang="en-GB" sz="1200" b="1" dirty="0" smtClean="0"/>
+                <a:t> moving through </a:t>
+              </a:r>
+              <a:r>
+                <a:rPr lang="en-GB" sz="1200" b="1" dirty="0" smtClean="0"/>
+                <a:t>space after 10 seconds</a:t>
+              </a:r>
+              <a:endParaRPr lang="en-GB" sz="1200" b="1" dirty="0" smtClean="0"/>
+            </a:p>
+          </p:txBody>
+        </p:sp>
+      </p:grpSp>
     </p:spTree>
     <p:extLst>
       <p:ext uri="{BB962C8B-B14F-4D97-AF65-F5344CB8AC3E}">
@@ -5342,7 +5524,7 @@
   <p:timing>
     <p:tnLst>
       <p:par>
-        <p:cTn id="1" dur="indefinite" restart="never" nodeType="tmRoot">
+        <p:cTn xmlns:p14="http://schemas.microsoft.com/office/powerpoint/2010/main" id="1" dur="indefinite" restart="never" nodeType="tmRoot">
           <p:childTnLst>
             <p:seq concurrent="1" nextAc="seek">
               <p:cTn id="2" dur="indefinite" nodeType="mainSeq">
@@ -5527,43 +5709,21 @@
                                   </p:childTnLst>
                                 </p:cTn>
                               </p:par>
-                            </p:childTnLst>
-                          </p:cTn>
-                        </p:par>
-                      </p:childTnLst>
-                    </p:cTn>
-                  </p:par>
-                  <p:par>
-                    <p:cTn id="18" fill="hold">
-                      <p:stCondLst>
-                        <p:cond delay="indefinite"/>
-                      </p:stCondLst>
-                      <p:childTnLst>
-                        <p:par>
-                          <p:cTn id="19" fill="hold">
-                            <p:stCondLst>
-                              <p:cond delay="0"/>
-                            </p:stCondLst>
-                            <p:childTnLst>
                               <p:par>
-                                <p:cTn id="20" presetID="10" presetClass="entr" presetSubtype="0" fill="hold" grpId="0" nodeType="clickEffect">
+                                <p:cTn id="18" presetID="10" presetClass="entr" presetSubtype="0" fill="hold" nodeType="withEffect">
                                   <p:stCondLst>
                                     <p:cond delay="0"/>
                                   </p:stCondLst>
                                   <p:childTnLst>
                                     <p:set>
                                       <p:cBhvr>
-                                        <p:cTn id="21" dur="1" fill="hold">
+                                        <p:cTn id="19" dur="1" fill="hold">
                                           <p:stCondLst>
                                             <p:cond delay="0"/>
                                           </p:stCondLst>
                                         </p:cTn>
                                         <p:tgtEl>
-                                          <p:spTgt spid="5">
-                                            <p:txEl>
-                                              <p:pRg st="3" end="3"/>
-                                            </p:txEl>
-                                          </p:spTgt>
+                                          <p:spTgt spid="2"/>
                                         </p:tgtEl>
                                         <p:attrNameLst>
                                           <p:attrName>style.visibility</p:attrName>
@@ -5575,13 +5735,9 @@
                                     </p:set>
                                     <p:animEffect transition="in" filter="fade">
                                       <p:cBhvr>
-                                        <p:cTn id="22" dur="500"/>
+                                        <p:cTn id="20" dur="500"/>
                                         <p:tgtEl>
-                                          <p:spTgt spid="5">
-                                            <p:txEl>
-                                              <p:pRg st="3" end="3"/>
-                                            </p:txEl>
-                                          </p:spTgt>
+                                          <p:spTgt spid="2"/>
                                         </p:tgtEl>
                                       </p:cBhvr>
                                     </p:animEffect>
@@ -5616,7 +5772,7 @@
       </p:par>
     </p:tnLst>
     <p:bldLst>
-      <p:bldP spid="5" grpId="0" uiExpand="1" build="p"/>
+      <p:bldP spid="5" grpId="0" build="p"/>
     </p:bldLst>
   </p:timing>
 </p:sld>
@@ -5656,229 +5812,6 @@
           <a:p>
             <a:r>
               <a:rPr lang="en-GB" dirty="0" smtClean="0"/>
-              <a:t>Current Work</a:t>
-            </a:r>
-            <a:endParaRPr lang="en-GB" dirty="0"/>
-          </a:p>
-        </p:txBody>
-      </p:sp>
-      <p:cxnSp>
-        <p:nvCxnSpPr>
-          <p:cNvPr id="6" name="Straight Arrow Connector 5"/>
-          <p:cNvCxnSpPr/>
-          <p:nvPr/>
-        </p:nvCxnSpPr>
-        <p:spPr>
-          <a:xfrm>
-            <a:off x="765593" y="1885836"/>
-            <a:ext cx="792088" cy="0"/>
-          </a:xfrm>
-          <a:prstGeom prst="straightConnector1">
-            <a:avLst/>
-          </a:prstGeom>
-          <a:ln w="38100">
-            <a:solidFill>
-              <a:schemeClr val="bg1">
-                <a:lumMod val="65000"/>
-              </a:schemeClr>
-            </a:solidFill>
-            <a:headEnd type="none" w="med" len="med"/>
-            <a:tailEnd type="triangle" w="med" len="med"/>
-          </a:ln>
-        </p:spPr>
-        <p:style>
-          <a:lnRef idx="1">
-            <a:schemeClr val="accent1"/>
-          </a:lnRef>
-          <a:fillRef idx="0">
-            <a:schemeClr val="accent1"/>
-          </a:fillRef>
-          <a:effectRef idx="0">
-            <a:schemeClr val="accent1"/>
-          </a:effectRef>
-          <a:fontRef idx="minor">
-            <a:schemeClr val="tx1"/>
-          </a:fontRef>
-        </p:style>
-      </p:cxnSp>
-      <p:cxnSp>
-        <p:nvCxnSpPr>
-          <p:cNvPr id="9" name="Straight Arrow Connector 8"/>
-          <p:cNvCxnSpPr/>
-          <p:nvPr/>
-        </p:nvCxnSpPr>
-        <p:spPr>
-          <a:xfrm flipH="1">
-            <a:off x="781090" y="1870338"/>
-            <a:ext cx="1" cy="792088"/>
-          </a:xfrm>
-          <a:prstGeom prst="straightConnector1">
-            <a:avLst/>
-          </a:prstGeom>
-          <a:ln w="38100">
-            <a:solidFill>
-              <a:schemeClr val="bg1">
-                <a:lumMod val="65000"/>
-              </a:schemeClr>
-            </a:solidFill>
-            <a:headEnd type="none" w="med" len="med"/>
-            <a:tailEnd type="triangle" w="med" len="med"/>
-          </a:ln>
-        </p:spPr>
-        <p:style>
-          <a:lnRef idx="1">
-            <a:schemeClr val="accent1"/>
-          </a:lnRef>
-          <a:fillRef idx="0">
-            <a:schemeClr val="accent1"/>
-          </a:fillRef>
-          <a:effectRef idx="0">
-            <a:schemeClr val="accent1"/>
-          </a:effectRef>
-          <a:fontRef idx="minor">
-            <a:schemeClr val="tx1"/>
-          </a:fontRef>
-        </p:style>
-      </p:cxnSp>
-      <p:pic>
-        <p:nvPicPr>
-          <p:cNvPr id="2052" name="Picture 4" descr="C:\Users\luiza\Documents\repositories\personal\project\msc-project\msc-model\target\explored-space-phero.png"/>
-          <p:cNvPicPr>
-            <a:picLocks noChangeAspect="1" noChangeArrowheads="1"/>
-          </p:cNvPicPr>
-          <p:nvPr/>
-        </p:nvPicPr>
-        <p:blipFill>
-          <a:blip r:embed="rId2">
-            <a:extLst>
-              <a:ext uri="{28A0092B-C50C-407E-A947-70E740481C1C}">
-                <a14:useLocalDpi xmlns:a14="http://schemas.microsoft.com/office/drawing/2010/main" val="0"/>
-              </a:ext>
-            </a:extLst>
-          </a:blip>
-          <a:srcRect/>
-          <a:stretch>
-            <a:fillRect/>
-          </a:stretch>
-        </p:blipFill>
-        <p:spPr bwMode="auto">
-          <a:xfrm>
-            <a:off x="938808" y="2055862"/>
-            <a:ext cx="1905000" cy="2381250"/>
-          </a:xfrm>
-          <a:prstGeom prst="rect">
-            <a:avLst/>
-          </a:prstGeom>
-          <a:noFill/>
-          <a:ln>
-            <a:solidFill>
-              <a:schemeClr val="bg1">
-                <a:lumMod val="65000"/>
-              </a:schemeClr>
-            </a:solidFill>
-          </a:ln>
-          <a:extLst>
-            <a:ext uri="{909E8E84-426E-40DD-AFC4-6F175D3DCCD1}">
-              <a14:hiddenFill xmlns:a14="http://schemas.microsoft.com/office/drawing/2010/main">
-                <a:solidFill>
-                  <a:srgbClr val="FFFFFF"/>
-                </a:solidFill>
-              </a14:hiddenFill>
-            </a:ext>
-          </a:extLst>
-        </p:spPr>
-      </p:pic>
-      <p:sp>
-        <p:nvSpPr>
-          <p:cNvPr id="10" name="TextBox 9"/>
-          <p:cNvSpPr txBox="1"/>
-          <p:nvPr/>
-        </p:nvSpPr>
-        <p:spPr>
-          <a:xfrm>
-            <a:off x="760742" y="4551511"/>
-            <a:ext cx="2371098" cy="461665"/>
-          </a:xfrm>
-          <a:prstGeom prst="rect">
-            <a:avLst/>
-          </a:prstGeom>
-          <a:noFill/>
-        </p:spPr>
-        <p:txBody>
-          <a:bodyPr wrap="none" rtlCol="0">
-            <a:spAutoFit/>
-          </a:bodyPr>
-          <a:lstStyle/>
-          <a:p>
-            <a:pPr algn="ctr"/>
-            <a:r>
-              <a:rPr lang="en-GB" sz="1200" b="1" dirty="0" smtClean="0"/>
-              <a:t>50 000 nodes, 10 agents randomly</a:t>
-            </a:r>
-          </a:p>
-          <a:p>
-            <a:pPr algn="ctr"/>
-            <a:r>
-              <a:rPr lang="en-GB" sz="1200" b="1" dirty="0" smtClean="0"/>
-              <a:t> moving through space</a:t>
-            </a:r>
-          </a:p>
-        </p:txBody>
-      </p:sp>
-    </p:spTree>
-    <p:extLst>
-      <p:ext uri="{BB962C8B-B14F-4D97-AF65-F5344CB8AC3E}">
-        <p14:creationId xmlns:p14="http://schemas.microsoft.com/office/powerpoint/2010/main" val="2699782112"/>
-      </p:ext>
-    </p:extLst>
-  </p:cSld>
-  <p:clrMapOvr>
-    <a:masterClrMapping/>
-  </p:clrMapOvr>
-  <p:timing>
-    <p:tnLst>
-      <p:par>
-        <p:cTn id="1" dur="indefinite" restart="never" nodeType="tmRoot"/>
-      </p:par>
-    </p:tnLst>
-  </p:timing>
-</p:sld>
-</file>
-
-<file path=ppt/slides/slide13.xml><?xml version="1.0" encoding="utf-8"?>
-<p:sld xmlns:a="http://schemas.openxmlformats.org/drawingml/2006/main" xmlns:r="http://schemas.openxmlformats.org/officeDocument/2006/relationships" xmlns:p="http://schemas.openxmlformats.org/presentationml/2006/main">
-  <p:cSld>
-    <p:spTree>
-      <p:nvGrpSpPr>
-        <p:cNvPr id="1" name=""/>
-        <p:cNvGrpSpPr/>
-        <p:nvPr/>
-      </p:nvGrpSpPr>
-      <p:grpSpPr>
-        <a:xfrm>
-          <a:off x="0" y="0"/>
-          <a:ext cx="0" cy="0"/>
-          <a:chOff x="0" y="0"/>
-          <a:chExt cx="0" cy="0"/>
-        </a:xfrm>
-      </p:grpSpPr>
-      <p:sp>
-        <p:nvSpPr>
-          <p:cNvPr id="3" name="Title 2"/>
-          <p:cNvSpPr>
-            <a:spLocks noGrp="1"/>
-          </p:cNvSpPr>
-          <p:nvPr>
-            <p:ph type="title"/>
-          </p:nvPr>
-        </p:nvSpPr>
-        <p:spPr/>
-        <p:txBody>
-          <a:bodyPr/>
-          <a:lstStyle/>
-          <a:p>
-            <a:r>
-              <a:rPr lang="en-GB" dirty="0" smtClean="0"/>
               <a:t>Challenges</a:t>
             </a:r>
             <a:endParaRPr lang="en-GB" dirty="0"/>
@@ -5916,9 +5849,10 @@
               <a:t>Pheromone trail updates need to be local</a:t>
             </a:r>
             <a:r>
-              <a:rPr lang="en-GB" dirty="0"/>
+              <a:rPr lang="en-GB" dirty="0" smtClean="0"/>
               <a:t>;</a:t>
             </a:r>
+            <a:endParaRPr lang="en-GB" dirty="0"/>
           </a:p>
           <a:p>
             <a:pPr>
@@ -5947,7 +5881,7 @@
   <p:timing>
     <p:tnLst>
       <p:par>
-        <p:cTn id="1" dur="indefinite" restart="never" nodeType="tmRoot">
+        <p:cTn xmlns:p14="http://schemas.microsoft.com/office/powerpoint/2010/main" id="1" dur="indefinite" restart="never" nodeType="tmRoot">
           <p:childTnLst>
             <p:seq concurrent="1" nextAc="seek">
               <p:cTn id="2" dur="indefinite" nodeType="mainSeq">
@@ -6166,7 +6100,7 @@
 </p:sld>
 </file>
 
-<file path=ppt/slides/slide14.xml><?xml version="1.0" encoding="utf-8"?>
+<file path=ppt/slides/slide13.xml><?xml version="1.0" encoding="utf-8"?>
 <p:sld xmlns:a="http://schemas.openxmlformats.org/drawingml/2006/main" xmlns:r="http://schemas.openxmlformats.org/officeDocument/2006/relationships" xmlns:p="http://schemas.openxmlformats.org/presentationml/2006/main">
   <p:cSld>
     <p:spTree>
@@ -7137,7 +7071,7 @@
   <p:timing>
     <p:tnLst>
       <p:par>
-        <p:cTn id="1" dur="indefinite" restart="never" nodeType="tmRoot"/>
+        <p:cTn xmlns:p14="http://schemas.microsoft.com/office/powerpoint/2010/main" id="1" dur="indefinite" restart="never" nodeType="tmRoot"/>
       </p:par>
     </p:tnLst>
   </p:timing>
@@ -7319,7 +7253,7 @@
   <p:timing>
     <p:tnLst>
       <p:par>
-        <p:cTn id="1" dur="indefinite" restart="never" nodeType="tmRoot">
+        <p:cTn xmlns:p14="http://schemas.microsoft.com/office/powerpoint/2010/main" id="1" dur="indefinite" restart="never" nodeType="tmRoot">
           <p:childTnLst>
             <p:seq concurrent="1" nextAc="seek">
               <p:cTn id="2" dur="indefinite" nodeType="mainSeq">
@@ -7938,7 +7872,7 @@
   <p:timing>
     <p:tnLst>
       <p:par>
-        <p:cTn id="1" dur="indefinite" restart="never" nodeType="tmRoot">
+        <p:cTn xmlns:p14="http://schemas.microsoft.com/office/powerpoint/2010/main" id="1" dur="indefinite" restart="never" nodeType="tmRoot">
           <p:childTnLst>
             <p:seq concurrent="1" nextAc="seek">
               <p:cTn id="2" dur="indefinite" nodeType="mainSeq">
@@ -8306,7 +8240,7 @@
   <p:timing>
     <p:tnLst>
       <p:par>
-        <p:cTn id="1" dur="indefinite" restart="never" nodeType="tmRoot">
+        <p:cTn xmlns:p14="http://schemas.microsoft.com/office/powerpoint/2010/main" id="1" dur="indefinite" restart="never" nodeType="tmRoot">
           <p:childTnLst>
             <p:seq concurrent="1" nextAc="seek">
               <p:cTn id="2" dur="indefinite" nodeType="mainSeq">
@@ -8550,7 +8484,7 @@
   <p:timing>
     <p:tnLst>
       <p:par>
-        <p:cTn id="1" dur="indefinite" restart="never" nodeType="tmRoot">
+        <p:cTn xmlns:p14="http://schemas.microsoft.com/office/powerpoint/2010/main" id="1" dur="indefinite" restart="never" nodeType="tmRoot">
           <p:childTnLst>
             <p:seq concurrent="1" nextAc="seek">
               <p:cTn id="2" dur="indefinite" nodeType="mainSeq">
@@ -8969,7 +8903,7 @@
   <p:timing>
     <p:tnLst>
       <p:par>
-        <p:cTn id="1" dur="indefinite" restart="never" nodeType="tmRoot">
+        <p:cTn xmlns:p14="http://schemas.microsoft.com/office/powerpoint/2010/main" id="1" dur="indefinite" restart="never" nodeType="tmRoot">
           <p:childTnLst>
             <p:seq concurrent="1" nextAc="seek">
               <p:cTn id="2" dur="indefinite" nodeType="mainSeq">
@@ -9290,9 +9224,9 @@
       </p:sp>
       <p:pic>
         <p:nvPicPr>
-          <p:cNvPr id="2051" name="Picture 3" descr="C:\Users\luiza\Documents\repositories\personal\project\msc-project\uml\class-06-07.png"/>
+          <p:cNvPr id="2" name="Picture 1" descr="class-06-07.png"/>
           <p:cNvPicPr>
-            <a:picLocks noChangeAspect="1" noChangeArrowheads="1"/>
+            <a:picLocks noChangeAspect="1"/>
           </p:cNvPicPr>
           <p:nvPr/>
         </p:nvPicPr>
@@ -9304,29 +9238,18 @@
               </a:ext>
             </a:extLst>
           </a:blip>
-          <a:srcRect/>
           <a:stretch>
             <a:fillRect/>
           </a:stretch>
         </p:blipFill>
-        <p:spPr bwMode="auto">
+        <p:spPr>
           <a:xfrm>
-            <a:off x="539552" y="1139262"/>
-            <a:ext cx="7979991" cy="4810018"/>
+            <a:off x="395536" y="1434461"/>
+            <a:ext cx="8495217" cy="4226787"/>
           </a:xfrm>
           <a:prstGeom prst="rect">
             <a:avLst/>
           </a:prstGeom>
-          <a:noFill/>
-          <a:extLst>
-            <a:ext uri="{909E8E84-426E-40DD-AFC4-6F175D3DCCD1}">
-              <a14:hiddenFill xmlns:a14="http://schemas.microsoft.com/office/drawing/2010/main">
-                <a:solidFill>
-                  <a:srgbClr val="FFFFFF"/>
-                </a:solidFill>
-              </a14:hiddenFill>
-            </a:ext>
-          </a:extLst>
         </p:spPr>
       </p:pic>
     </p:spTree>
@@ -9342,7 +9265,7 @@
   <p:timing>
     <p:tnLst>
       <p:par>
-        <p:cTn id="1" dur="indefinite" restart="never" nodeType="tmRoot"/>
+        <p:cTn xmlns:p14="http://schemas.microsoft.com/office/powerpoint/2010/main" id="1" dur="indefinite" restart="never" nodeType="tmRoot"/>
       </p:par>
     </p:tnLst>
   </p:timing>
@@ -9529,7 +9452,7 @@
   <p:timing>
     <p:tnLst>
       <p:par>
-        <p:cTn id="1" dur="indefinite" restart="never" nodeType="tmRoot">
+        <p:cTn xmlns:p14="http://schemas.microsoft.com/office/powerpoint/2010/main" id="1" dur="indefinite" restart="never" nodeType="tmRoot">
           <p:childTnLst>
             <p:seq concurrent="1" nextAc="seek">
               <p:cTn id="2" dur="indefinite" nodeType="mainSeq">
@@ -9872,7 +9795,7 @@
           <a:graphicData uri="http://schemas.openxmlformats.org/presentationml/2006/ole">
             <mc:AlternateContent xmlns:mc="http://schemas.openxmlformats.org/markup-compatibility/2006">
               <mc:Choice xmlns:v="urn:schemas-microsoft-com:vml" Requires="v">
-                <p:oleObj spid="_x0000_s1074" name="Equation" r:id="rId4" imgW="914400" imgH="406400" progId="Equation.3">
+                <p:oleObj spid="_x0000_s1079" name="Equation" r:id="rId4" imgW="914400" imgH="406400" progId="Equation.3">
                   <p:embed/>
                 </p:oleObj>
               </mc:Choice>
@@ -9984,7 +9907,7 @@
   <p:timing>
     <p:tnLst>
       <p:par>
-        <p:cTn id="1" dur="indefinite" restart="never" nodeType="tmRoot"/>
+        <p:cTn xmlns:p14="http://schemas.microsoft.com/office/powerpoint/2010/main" id="1" dur="indefinite" restart="never" nodeType="tmRoot"/>
       </p:par>
     </p:tnLst>
   </p:timing>

</xml_diff>